<commit_message>
finished through Module 02
</commit_message>
<xml_diff>
--- a/Slides/Lesson 0.1 Goals of this Course.pptx
+++ b/Slides/Lesson 0.1 Goals of this Course.pptx
@@ -5,7 +5,7 @@
     <p:sldMasterId id="2147483672" r:id="rId1"/>
   </p:sldMasterIdLst>
   <p:notesMasterIdLst>
-    <p:notesMasterId r:id="rId18"/>
+    <p:notesMasterId r:id="rId19"/>
   </p:notesMasterIdLst>
   <p:sldIdLst>
     <p:sldId id="257" r:id="rId2"/>
@@ -22,8 +22,9 @@
     <p:sldId id="270" r:id="rId13"/>
     <p:sldId id="267" r:id="rId14"/>
     <p:sldId id="271" r:id="rId15"/>
-    <p:sldId id="272" r:id="rId16"/>
-    <p:sldId id="273" r:id="rId17"/>
+    <p:sldId id="282" r:id="rId16"/>
+    <p:sldId id="281" r:id="rId17"/>
+    <p:sldId id="273" r:id="rId18"/>
   </p:sldIdLst>
   <p:sldSz cx="9144000" cy="6858000" type="screen4x3"/>
   <p:notesSz cx="6858000" cy="9144000"/>
@@ -223,7 +224,7 @@
           <a:p>
             <a:fld id="{39B146F0-9122-4808-B0F9-3E08B8294872}" type="datetimeFigureOut">
               <a:rPr lang="en-US" smtClean="0"/>
-              <a:t>8/4/2015</a:t>
+              <a:t>8/13/2015</a:t>
             </a:fld>
             <a:endParaRPr lang="en-US"/>
           </a:p>
@@ -1082,15 +1083,7 @@
           <a:bodyPr/>
           <a:lstStyle/>
           <a:p>
-            <a:r>
-              <a:rPr lang="en-US" dirty="0" smtClean="0"/>
-              <a:t>As we go through the course, we will learn about more and more complicated kinds of data design and design strategies.  This map</a:t>
-            </a:r>
-            <a:r>
-              <a:rPr lang="en-US" baseline="0" dirty="0" smtClean="0"/>
-              <a:t>, which we will show at the beginning of every module, will help you see where you are in the course content.</a:t>
-            </a:r>
-            <a:endParaRPr lang="en-US" dirty="0"/>
+            <a:endParaRPr lang="en-US"/>
           </a:p>
         </p:txBody>
       </p:sp>
@@ -1111,91 +1104,7 @@
           <a:p>
             <a:fld id="{9680CC5F-B70A-4D86-BBBF-E132BC41B131}" type="slidenum">
               <a:rPr lang="en-US" smtClean="0"/>
-              <a:t>15</a:t>
-            </a:fld>
-            <a:endParaRPr lang="en-US"/>
-          </a:p>
-        </p:txBody>
-      </p:sp>
-    </p:spTree>
-    <p:extLst>
-      <p:ext uri="{BB962C8B-B14F-4D97-AF65-F5344CB8AC3E}">
-        <p14:creationId xmlns:p14="http://schemas.microsoft.com/office/powerpoint/2010/main" val="518968164"/>
-      </p:ext>
-    </p:extLst>
-  </p:cSld>
-  <p:clrMapOvr>
-    <a:masterClrMapping/>
-  </p:clrMapOvr>
-</p:notes>
-</file>
-
-<file path=ppt/notesSlides/notesSlide16.xml><?xml version="1.0" encoding="utf-8"?>
-<p:notes xmlns:a="http://schemas.openxmlformats.org/drawingml/2006/main" xmlns:r="http://schemas.openxmlformats.org/officeDocument/2006/relationships" xmlns:p="http://schemas.openxmlformats.org/presentationml/2006/main">
-  <p:cSld>
-    <p:spTree>
-      <p:nvGrpSpPr>
-        <p:cNvPr id="1" name=""/>
-        <p:cNvGrpSpPr/>
-        <p:nvPr/>
-      </p:nvGrpSpPr>
-      <p:grpSpPr>
-        <a:xfrm>
-          <a:off x="0" y="0"/>
-          <a:ext cx="0" cy="0"/>
-          <a:chOff x="0" y="0"/>
-          <a:chExt cx="0" cy="0"/>
-        </a:xfrm>
-      </p:grpSpPr>
-      <p:sp>
-        <p:nvSpPr>
-          <p:cNvPr id="2" name="Slide Image Placeholder 1"/>
-          <p:cNvSpPr>
-            <a:spLocks noGrp="1" noRot="1" noChangeAspect="1"/>
-          </p:cNvSpPr>
-          <p:nvPr>
-            <p:ph type="sldImg"/>
-          </p:nvPr>
-        </p:nvSpPr>
-        <p:spPr/>
-      </p:sp>
-      <p:sp>
-        <p:nvSpPr>
-          <p:cNvPr id="3" name="Notes Placeholder 2"/>
-          <p:cNvSpPr>
-            <a:spLocks noGrp="1"/>
-          </p:cNvSpPr>
-          <p:nvPr>
-            <p:ph type="body" idx="1"/>
-          </p:nvPr>
-        </p:nvSpPr>
-        <p:spPr/>
-        <p:txBody>
-          <a:bodyPr/>
-          <a:lstStyle/>
-          <a:p>
-            <a:endParaRPr lang="en-US"/>
-          </a:p>
-        </p:txBody>
-      </p:sp>
-      <p:sp>
-        <p:nvSpPr>
-          <p:cNvPr id="4" name="Slide Number Placeholder 3"/>
-          <p:cNvSpPr>
-            <a:spLocks noGrp="1"/>
-          </p:cNvSpPr>
-          <p:nvPr>
-            <p:ph type="sldNum" sz="quarter" idx="10"/>
-          </p:nvPr>
-        </p:nvSpPr>
-        <p:spPr/>
-        <p:txBody>
-          <a:bodyPr/>
-          <a:lstStyle/>
-          <a:p>
-            <a:fld id="{9680CC5F-B70A-4D86-BBBF-E132BC41B131}" type="slidenum">
-              <a:rPr lang="en-US" smtClean="0"/>
-              <a:t>16</a:t>
+              <a:t>17</a:t>
             </a:fld>
             <a:endParaRPr lang="en-US"/>
           </a:p>
@@ -2075,7 +1984,7 @@
                   </a:prstClr>
                 </a:solidFill>
               </a:rPr>
-              <a:t>8/4/2015</a:t>
+              <a:t>8/13/2015</a:t>
             </a:fld>
             <a:endParaRPr lang="en-US">
               <a:solidFill>
@@ -2366,7 +2275,7 @@
                   </a:prstClr>
                 </a:solidFill>
               </a:rPr>
-              <a:t>8/4/2015</a:t>
+              <a:t>8/13/2015</a:t>
             </a:fld>
             <a:endParaRPr lang="en-US">
               <a:solidFill>
@@ -2567,7 +2476,7 @@
                   </a:prstClr>
                 </a:solidFill>
               </a:rPr>
-              <a:t>8/4/2015</a:t>
+              <a:t>8/13/2015</a:t>
             </a:fld>
             <a:endParaRPr lang="en-US">
               <a:solidFill>
@@ -2778,7 +2687,7 @@
                   </a:prstClr>
                 </a:solidFill>
               </a:rPr>
-              <a:t>8/4/2015</a:t>
+              <a:t>8/13/2015</a:t>
             </a:fld>
             <a:endParaRPr lang="en-US">
               <a:solidFill>
@@ -2985,7 +2894,7 @@
                   </a:prstClr>
                 </a:solidFill>
               </a:rPr>
-              <a:t>8/4/2015</a:t>
+              <a:t>8/13/2015</a:t>
             </a:fld>
             <a:endParaRPr lang="en-US" dirty="0">
               <a:solidFill>
@@ -3141,7 +3050,7 @@
                   </a:prstClr>
                 </a:solidFill>
               </a:rPr>
-              <a:t>8/4/2015</a:t>
+              <a:t>8/13/2015</a:t>
             </a:fld>
             <a:endParaRPr lang="en-US">
               <a:solidFill>
@@ -3418,7 +3327,7 @@
                   </a:prstClr>
                 </a:solidFill>
               </a:rPr>
-              <a:t>8/4/2015</a:t>
+              <a:t>8/13/2015</a:t>
             </a:fld>
             <a:endParaRPr lang="en-US">
               <a:solidFill>
@@ -3737,7 +3646,7 @@
                   </a:prstClr>
                 </a:solidFill>
               </a:rPr>
-              <a:t>8/4/2015</a:t>
+              <a:t>8/13/2015</a:t>
             </a:fld>
             <a:endParaRPr lang="en-US">
               <a:solidFill>
@@ -4190,7 +4099,7 @@
                   </a:prstClr>
                 </a:solidFill>
               </a:rPr>
-              <a:t>8/4/2015</a:t>
+              <a:t>8/13/2015</a:t>
             </a:fld>
             <a:endParaRPr lang="en-US">
               <a:solidFill>
@@ -4339,7 +4248,7 @@
                   </a:prstClr>
                 </a:solidFill>
               </a:rPr>
-              <a:t>8/4/2015</a:t>
+              <a:t>8/13/2015</a:t>
             </a:fld>
             <a:endParaRPr lang="en-US">
               <a:solidFill>
@@ -4465,7 +4374,7 @@
                   </a:prstClr>
                 </a:solidFill>
               </a:rPr>
-              <a:t>8/4/2015</a:t>
+              <a:t>8/13/2015</a:t>
             </a:fld>
             <a:endParaRPr lang="en-US">
               <a:solidFill>
@@ -4773,7 +4682,7 @@
                   </a:prstClr>
                 </a:solidFill>
               </a:rPr>
-              <a:t>8/4/2015</a:t>
+              <a:t>8/13/2015</a:t>
             </a:fld>
             <a:endParaRPr lang="en-US">
               <a:solidFill>
@@ -5017,7 +4926,7 @@
                   </a:prstClr>
                 </a:solidFill>
               </a:rPr>
-              <a:t>8/4/2015</a:t>
+              <a:t>8/13/2015</a:t>
             </a:fld>
             <a:endParaRPr lang="en-US">
               <a:solidFill>
@@ -5443,15 +5352,7 @@
           <a:p>
             <a:r>
               <a:rPr lang="en-US" dirty="0" smtClean="0"/>
-              <a:t>The Point</a:t>
-            </a:r>
-            <a:r>
-              <a:rPr lang="en-US" dirty="0" smtClean="0"/>
-              <a:t> </a:t>
-            </a:r>
-            <a:r>
-              <a:rPr lang="en-US" dirty="0" smtClean="0"/>
-              <a:t>of </a:t>
+              <a:t>The Point of </a:t>
             </a:r>
             <a:r>
               <a:rPr lang="en-US" dirty="0"/>
@@ -5488,11 +5389,7 @@
           <a:p>
             <a:r>
               <a:rPr lang="en-US" dirty="0" smtClean="0"/>
-              <a:t>Lesson </a:t>
-            </a:r>
-            <a:r>
-              <a:rPr lang="en-US" dirty="0" smtClean="0"/>
-              <a:t>0.1</a:t>
+              <a:t>Lesson 0.1</a:t>
             </a:r>
             <a:endParaRPr lang="en-US" dirty="0"/>
           </a:p>
@@ -6744,6 +6641,128 @@
 </file>
 
 <file path=ppt/slides/slide15.xml><?xml version="1.0" encoding="utf-8"?>
+<p:sld xmlns:a="http://schemas.openxmlformats.org/drawingml/2006/main" xmlns:r="http://schemas.openxmlformats.org/officeDocument/2006/relationships" xmlns:p="http://schemas.openxmlformats.org/presentationml/2006/main">
+  <p:cSld>
+    <p:spTree>
+      <p:nvGrpSpPr>
+        <p:cNvPr id="1" name=""/>
+        <p:cNvGrpSpPr/>
+        <p:nvPr/>
+      </p:nvGrpSpPr>
+      <p:grpSpPr>
+        <a:xfrm>
+          <a:off x="0" y="0"/>
+          <a:ext cx="0" cy="0"/>
+          <a:chOff x="0" y="0"/>
+          <a:chExt cx="0" cy="0"/>
+        </a:xfrm>
+      </p:grpSpPr>
+      <p:sp>
+        <p:nvSpPr>
+          <p:cNvPr id="2" name="Title 1"/>
+          <p:cNvSpPr>
+            <a:spLocks noGrp="1"/>
+          </p:cNvSpPr>
+          <p:nvPr>
+            <p:ph type="title"/>
+          </p:nvPr>
+        </p:nvSpPr>
+        <p:spPr/>
+        <p:txBody>
+          <a:bodyPr/>
+          <a:lstStyle/>
+          <a:p>
+            <a:r>
+              <a:rPr lang="en-US" dirty="0" smtClean="0"/>
+              <a:t>The Course Map</a:t>
+            </a:r>
+            <a:endParaRPr lang="en-US" dirty="0"/>
+          </a:p>
+        </p:txBody>
+      </p:sp>
+      <p:sp>
+        <p:nvSpPr>
+          <p:cNvPr id="3" name="Content Placeholder 2"/>
+          <p:cNvSpPr>
+            <a:spLocks noGrp="1"/>
+          </p:cNvSpPr>
+          <p:nvPr>
+            <p:ph idx="1"/>
+          </p:nvPr>
+        </p:nvSpPr>
+        <p:spPr/>
+        <p:txBody>
+          <a:bodyPr/>
+          <a:lstStyle/>
+          <a:p>
+            <a:r>
+              <a:rPr lang="en-US" dirty="0"/>
+              <a:t>As we go through the course, we will learn about more and more complicated kinds of data design and design strategies.  </a:t>
+            </a:r>
+            <a:r>
+              <a:rPr lang="en-US" dirty="0" smtClean="0"/>
+              <a:t>The map on the next slide, </a:t>
+            </a:r>
+            <a:r>
+              <a:rPr lang="en-US" dirty="0"/>
+              <a:t>which we will show at the beginning of every module, will help you see where you are in the course content.</a:t>
+            </a:r>
+          </a:p>
+          <a:p>
+            <a:endParaRPr lang="en-US" dirty="0"/>
+          </a:p>
+        </p:txBody>
+      </p:sp>
+      <p:sp>
+        <p:nvSpPr>
+          <p:cNvPr id="4" name="Slide Number Placeholder 3"/>
+          <p:cNvSpPr>
+            <a:spLocks noGrp="1"/>
+          </p:cNvSpPr>
+          <p:nvPr>
+            <p:ph type="sldNum" sz="quarter" idx="12"/>
+          </p:nvPr>
+        </p:nvSpPr>
+        <p:spPr/>
+        <p:txBody>
+          <a:bodyPr/>
+          <a:lstStyle/>
+          <a:p>
+            <a:fld id="{B6F15528-21DE-4FAA-801E-634DDDAF4B2B}" type="slidenum">
+              <a:rPr lang="en-US" smtClean="0">
+                <a:solidFill>
+                  <a:prstClr val="black">
+                    <a:tint val="75000"/>
+                  </a:prstClr>
+                </a:solidFill>
+              </a:rPr>
+              <a:pPr/>
+              <a:t>15</a:t>
+            </a:fld>
+            <a:endParaRPr lang="en-US" dirty="0">
+              <a:solidFill>
+                <a:prstClr val="black">
+                  <a:tint val="75000"/>
+                </a:prstClr>
+              </a:solidFill>
+            </a:endParaRPr>
+          </a:p>
+        </p:txBody>
+      </p:sp>
+    </p:spTree>
+    <p:extLst>
+      <p:ext uri="{BB962C8B-B14F-4D97-AF65-F5344CB8AC3E}">
+        <p14:creationId xmlns:p14="http://schemas.microsoft.com/office/powerpoint/2010/main" val="10033560"/>
+      </p:ext>
+    </p:extLst>
+  </p:cSld>
+  <p:clrMapOvr>
+    <a:masterClrMapping/>
+  </p:clrMapOvr>
+</p:sld>
+</file>
+
+<file path=ppt/slides/slide16.xml><?xml version="1.0" encoding="utf-8"?>
 <p:sld xmlns:a="http://schemas.openxmlformats.org/drawingml/2006/main" xmlns:r="http://schemas.openxmlformats.org/officeDocument/2006/relationships" xmlns:p="http://schemas.openxmlformats.org/presentationml/2006/main">
   <p:cSld>
     <p:spTree>
@@ -7560,7 +7579,7 @@
               <a:pPr algn="ctr"/>
               <a:r>
                 <a:rPr lang="en-US" dirty="0" smtClean="0"/>
-                <a:t>Function Composition</a:t>
+                <a:t>Combine simpler functions</a:t>
               </a:r>
               <a:endParaRPr lang="en-US" dirty="0"/>
             </a:p>
@@ -7608,7 +7627,7 @@
               <a:pPr algn="ctr"/>
               <a:r>
                 <a:rPr lang="en-US" dirty="0" smtClean="0"/>
-                <a:t>Structural Decomposition</a:t>
+                <a:t>Use a template</a:t>
               </a:r>
               <a:endParaRPr lang="en-US" dirty="0"/>
             </a:p>
@@ -7656,7 +7675,7 @@
               <a:pPr algn="ctr"/>
               <a:r>
                 <a:rPr lang="en-US" dirty="0" smtClean="0"/>
-                <a:t>Generalization</a:t>
+                <a:t>Divide into Cases</a:t>
               </a:r>
               <a:endParaRPr lang="en-US" dirty="0"/>
             </a:p>
@@ -7704,7 +7723,7 @@
               <a:pPr algn="ctr"/>
               <a:r>
                 <a:rPr lang="en-US" dirty="0" smtClean="0"/>
-                <a:t>General Recursion</a:t>
+                <a:t>Call a more general function</a:t>
               </a:r>
               <a:endParaRPr lang="en-US" dirty="0"/>
             </a:p>
@@ -7752,7 +7771,11 @@
               <a:pPr algn="ctr"/>
               <a:r>
                 <a:rPr lang="en-US" dirty="0" smtClean="0"/>
-                <a:t>Communication via State</a:t>
+                <a:t>Communicate </a:t>
+              </a:r>
+              <a:r>
+                <a:rPr lang="en-US" dirty="0" smtClean="0"/>
+                <a:t>via State</a:t>
               </a:r>
               <a:endParaRPr lang="en-US" dirty="0"/>
             </a:p>
@@ -8252,7 +8275,7 @@
         <p:nvCxnSpPr>
           <p:cNvPr id="113" name="Elbow Connector 112"/>
           <p:cNvCxnSpPr>
-            <a:stCxn id="28" idx="3"/>
+            <a:stCxn id="38" idx="3"/>
             <a:endCxn id="7" idx="1"/>
           </p:cNvCxnSpPr>
           <p:nvPr/>
@@ -8260,7 +8283,7 @@
         <p:spPr>
           <a:xfrm flipV="1">
             <a:off x="5486400" y="2024487"/>
-            <a:ext cx="914400" cy="2016706"/>
+            <a:ext cx="914400" cy="3025059"/>
           </a:xfrm>
           <a:prstGeom prst="bentConnector3">
             <a:avLst>
@@ -8301,31 +8324,18 @@
           <a:bodyPr/>
           <a:lstStyle/>
           <a:p>
-            <a:fld id="{B6F15528-21DE-4FAA-801E-634DDDAF4B2B}" type="slidenum">
-              <a:rPr lang="en-US" smtClean="0">
-                <a:solidFill>
-                  <a:prstClr val="black">
-                    <a:tint val="75000"/>
-                  </a:prstClr>
-                </a:solidFill>
-              </a:rPr>
-              <a:pPr/>
-              <a:t>15</a:t>
+            <a:fld id="{2AF3B5EA-18B6-4040-9F78-6052AF49C681}" type="slidenum">
+              <a:rPr lang="en-US" smtClean="0"/>
+              <a:t>16</a:t>
             </a:fld>
-            <a:endParaRPr lang="en-US">
-              <a:solidFill>
-                <a:prstClr val="black">
-                  <a:tint val="75000"/>
-                </a:prstClr>
-              </a:solidFill>
-            </a:endParaRPr>
+            <a:endParaRPr lang="en-US"/>
           </a:p>
         </p:txBody>
       </p:sp>
     </p:spTree>
     <p:extLst>
       <p:ext uri="{BB962C8B-B14F-4D97-AF65-F5344CB8AC3E}">
-        <p14:creationId xmlns:p14="http://schemas.microsoft.com/office/powerpoint/2010/main" val="783556080"/>
+        <p14:creationId xmlns:p14="http://schemas.microsoft.com/office/powerpoint/2010/main" val="822679658"/>
       </p:ext>
     </p:extLst>
   </p:cSld>
@@ -8342,7 +8352,7 @@
 </p:sld>
 </file>
 
-<file path=ppt/slides/slide16.xml><?xml version="1.0" encoding="utf-8"?>
+<file path=ppt/slides/slide17.xml><?xml version="1.0" encoding="utf-8"?>
 <p:sld xmlns:a="http://schemas.openxmlformats.org/drawingml/2006/main" xmlns:r="http://schemas.openxmlformats.org/officeDocument/2006/relationships" xmlns:p="http://schemas.openxmlformats.org/presentationml/2006/main">
   <p:cSld>
     <p:spTree>
@@ -8435,7 +8445,7 @@
                 </a:solidFill>
               </a:rPr>
               <a:pPr/>
-              <a:t>16</a:t>
+              <a:t>17</a:t>
             </a:fld>
             <a:endParaRPr lang="en-US" dirty="0">
               <a:solidFill>

</xml_diff>

<commit_message>
site ready for initial rollout
</commit_message>
<xml_diff>
--- a/Slides/Lesson 0.1 Goals of this Course.pptx
+++ b/Slides/Lesson 0.1 Goals of this Course.pptx
@@ -224,7 +224,7 @@
           <a:p>
             <a:fld id="{39B146F0-9122-4808-B0F9-3E08B8294872}" type="datetimeFigureOut">
               <a:rPr lang="en-US" smtClean="0"/>
-              <a:t>8/13/2015</a:t>
+              <a:t>7/25/2016</a:t>
             </a:fld>
             <a:endParaRPr lang="en-US"/>
           </a:p>
@@ -288,38 +288,37 @@
           <a:p>
             <a:pPr lvl="0"/>
             <a:r>
-              <a:rPr lang="en-US" smtClean="0"/>
+              <a:rPr lang="en-US"/>
               <a:t>Click to edit Master text styles</a:t>
             </a:r>
           </a:p>
           <a:p>
             <a:pPr lvl="1"/>
             <a:r>
-              <a:rPr lang="en-US" smtClean="0"/>
+              <a:rPr lang="en-US"/>
               <a:t>Second level</a:t>
             </a:r>
           </a:p>
           <a:p>
             <a:pPr lvl="2"/>
             <a:r>
-              <a:rPr lang="en-US" smtClean="0"/>
+              <a:rPr lang="en-US"/>
               <a:t>Third level</a:t>
             </a:r>
           </a:p>
           <a:p>
             <a:pPr lvl="3"/>
             <a:r>
-              <a:rPr lang="en-US" smtClean="0"/>
+              <a:rPr lang="en-US"/>
               <a:t>Fourth level</a:t>
             </a:r>
           </a:p>
           <a:p>
             <a:pPr lvl="4"/>
             <a:r>
-              <a:rPr lang="en-US" smtClean="0"/>
+              <a:rPr lang="en-US"/>
               <a:t>Fifth level</a:t>
             </a:r>
-            <a:endParaRPr lang="en-US"/>
           </a:p>
         </p:txBody>
       </p:sp>
@@ -544,28 +543,27 @@
           <a:lstStyle/>
           <a:p>
             <a:r>
-              <a:rPr lang="en-US" dirty="0" smtClean="0"/>
-              <a:t>Welcome to CS 50-10, Program Design Paradigms, also known as “Bootcamp”</a:t>
-            </a:r>
-          </a:p>
-          <a:p>
-            <a:endParaRPr lang="en-US" dirty="0" smtClean="0"/>
-          </a:p>
-          <a:p>
-            <a:r>
-              <a:rPr lang="en-US" dirty="0" smtClean="0"/>
+              <a:rPr lang="en-US" dirty="0"/>
+              <a:t>Welcome to CS 5010, Program Design Paradigms, also known as “Bootcamp”</a:t>
+            </a:r>
+          </a:p>
+          <a:p>
+            <a:endParaRPr lang="en-US" dirty="0"/>
+          </a:p>
+          <a:p>
+            <a:r>
+              <a:rPr lang="en-US" dirty="0"/>
               <a:t>I’m Professor Wand, and I will be your instructor in this online course.</a:t>
             </a:r>
           </a:p>
           <a:p>
-            <a:endParaRPr lang="en-US" dirty="0" smtClean="0"/>
-          </a:p>
-          <a:p>
-            <a:r>
-              <a:rPr lang="en-US" dirty="0" smtClean="0"/>
+            <a:endParaRPr lang="en-US" dirty="0"/>
+          </a:p>
+          <a:p>
+            <a:r>
+              <a:rPr lang="en-US" dirty="0"/>
               <a:t>In this lesson, we will learn about the goals of this course and about some of the educational philosophy behind it.</a:t>
             </a:r>
-            <a:endParaRPr lang="en-US" dirty="0"/>
           </a:p>
         </p:txBody>
       </p:sp>
@@ -995,10 +993,9 @@
           <a:lstStyle/>
           <a:p>
             <a:r>
-              <a:rPr lang="en-US" dirty="0" smtClean="0"/>
+              <a:rPr lang="en-US" dirty="0"/>
               <a:t>Here is the function design recipe.  </a:t>
             </a:r>
-            <a:endParaRPr lang="en-US" dirty="0"/>
           </a:p>
         </p:txBody>
       </p:sp>
@@ -1835,10 +1832,9 @@
           <a:lstStyle/>
           <a:p>
             <a:r>
-              <a:rPr lang="en-US" smtClean="0"/>
+              <a:rPr lang="en-US"/>
               <a:t>Click to edit Master title style</a:t>
             </a:r>
-            <a:endParaRPr lang="en-US"/>
           </a:p>
         </p:txBody>
       </p:sp>
@@ -1954,10 +1950,9 @@
           </a:lstStyle>
           <a:p>
             <a:r>
-              <a:rPr lang="en-US" smtClean="0"/>
+              <a:rPr lang="en-US"/>
               <a:t>Click to edit Master subtitle style</a:t>
             </a:r>
-            <a:endParaRPr lang="en-US"/>
           </a:p>
         </p:txBody>
       </p:sp>
@@ -1984,7 +1979,7 @@
                   </a:prstClr>
                 </a:solidFill>
               </a:rPr>
-              <a:t>8/13/2015</a:t>
+              <a:t>7/25/2016</a:t>
             </a:fld>
             <a:endParaRPr lang="en-US">
               <a:solidFill>
@@ -2067,13 +2062,6 @@
   <p:clrMapOvr>
     <a:masterClrMapping/>
   </p:clrMapOvr>
-  <p:timing>
-    <p:tnLst>
-      <p:par>
-        <p:cTn id="1" dur="indefinite" restart="never" nodeType="tmRoot"/>
-      </p:par>
-    </p:tnLst>
-  </p:timing>
 </p:sldLayout>
 </file>
 
@@ -2119,10 +2107,9 @@
           </a:lstStyle>
           <a:p>
             <a:r>
-              <a:rPr lang="en-US" smtClean="0"/>
+              <a:rPr lang="en-US"/>
               <a:t>Click to edit Master title style</a:t>
             </a:r>
-            <a:endParaRPr lang="en-US"/>
           </a:p>
         </p:txBody>
       </p:sp>
@@ -2246,7 +2233,7 @@
           <a:p>
             <a:pPr lvl="0"/>
             <a:r>
-              <a:rPr lang="en-US" smtClean="0"/>
+              <a:rPr lang="en-US"/>
               <a:t>Click to edit Master text styles</a:t>
             </a:r>
           </a:p>
@@ -2275,7 +2262,7 @@
                   </a:prstClr>
                 </a:solidFill>
               </a:rPr>
-              <a:t>8/13/2015</a:t>
+              <a:t>7/25/2016</a:t>
             </a:fld>
             <a:endParaRPr lang="en-US">
               <a:solidFill>
@@ -2394,10 +2381,9 @@
           <a:lstStyle/>
           <a:p>
             <a:r>
-              <a:rPr lang="en-US" smtClean="0"/>
+              <a:rPr lang="en-US"/>
               <a:t>Click to edit Master title style</a:t>
             </a:r>
-            <a:endParaRPr lang="en-US"/>
           </a:p>
         </p:txBody>
       </p:sp>
@@ -2418,38 +2404,37 @@
           <a:p>
             <a:pPr lvl="0"/>
             <a:r>
-              <a:rPr lang="en-US" smtClean="0"/>
+              <a:rPr lang="en-US"/>
               <a:t>Click to edit Master text styles</a:t>
             </a:r>
           </a:p>
           <a:p>
             <a:pPr lvl="1"/>
             <a:r>
-              <a:rPr lang="en-US" smtClean="0"/>
+              <a:rPr lang="en-US"/>
               <a:t>Second level</a:t>
             </a:r>
           </a:p>
           <a:p>
             <a:pPr lvl="2"/>
             <a:r>
-              <a:rPr lang="en-US" smtClean="0"/>
+              <a:rPr lang="en-US"/>
               <a:t>Third level</a:t>
             </a:r>
           </a:p>
           <a:p>
             <a:pPr lvl="3"/>
             <a:r>
-              <a:rPr lang="en-US" smtClean="0"/>
+              <a:rPr lang="en-US"/>
               <a:t>Fourth level</a:t>
             </a:r>
           </a:p>
           <a:p>
             <a:pPr lvl="4"/>
             <a:r>
-              <a:rPr lang="en-US" smtClean="0"/>
+              <a:rPr lang="en-US"/>
               <a:t>Fifth level</a:t>
             </a:r>
-            <a:endParaRPr lang="en-US"/>
           </a:p>
         </p:txBody>
       </p:sp>
@@ -2476,7 +2461,7 @@
                   </a:prstClr>
                 </a:solidFill>
               </a:rPr>
-              <a:t>8/13/2015</a:t>
+              <a:t>7/25/2016</a:t>
             </a:fld>
             <a:endParaRPr lang="en-US">
               <a:solidFill>
@@ -2600,10 +2585,9 @@
           <a:lstStyle/>
           <a:p>
             <a:r>
-              <a:rPr lang="en-US" smtClean="0"/>
+              <a:rPr lang="en-US"/>
               <a:t>Click to edit Master title style</a:t>
             </a:r>
-            <a:endParaRPr lang="en-US"/>
           </a:p>
         </p:txBody>
       </p:sp>
@@ -2629,38 +2613,37 @@
           <a:p>
             <a:pPr lvl="0"/>
             <a:r>
-              <a:rPr lang="en-US" smtClean="0"/>
+              <a:rPr lang="en-US"/>
               <a:t>Click to edit Master text styles</a:t>
             </a:r>
           </a:p>
           <a:p>
             <a:pPr lvl="1"/>
             <a:r>
-              <a:rPr lang="en-US" smtClean="0"/>
+              <a:rPr lang="en-US"/>
               <a:t>Second level</a:t>
             </a:r>
           </a:p>
           <a:p>
             <a:pPr lvl="2"/>
             <a:r>
-              <a:rPr lang="en-US" smtClean="0"/>
+              <a:rPr lang="en-US"/>
               <a:t>Third level</a:t>
             </a:r>
           </a:p>
           <a:p>
             <a:pPr lvl="3"/>
             <a:r>
-              <a:rPr lang="en-US" smtClean="0"/>
+              <a:rPr lang="en-US"/>
               <a:t>Fourth level</a:t>
             </a:r>
           </a:p>
           <a:p>
             <a:pPr lvl="4"/>
             <a:r>
-              <a:rPr lang="en-US" smtClean="0"/>
+              <a:rPr lang="en-US"/>
               <a:t>Fifth level</a:t>
             </a:r>
-            <a:endParaRPr lang="en-US"/>
           </a:p>
         </p:txBody>
       </p:sp>
@@ -2687,7 +2670,7 @@
                   </a:prstClr>
                 </a:solidFill>
               </a:rPr>
-              <a:t>8/13/2015</a:t>
+              <a:t>7/25/2016</a:t>
             </a:fld>
             <a:endParaRPr lang="en-US">
               <a:solidFill>
@@ -2812,10 +2795,9 @@
           <a:lstStyle/>
           <a:p>
             <a:r>
-              <a:rPr lang="en-US" dirty="0" smtClean="0"/>
+              <a:rPr lang="en-US" dirty="0"/>
               <a:t>Click to edit Master title style</a:t>
             </a:r>
-            <a:endParaRPr lang="en-US" dirty="0"/>
           </a:p>
         </p:txBody>
       </p:sp>
@@ -2836,38 +2818,37 @@
           <a:p>
             <a:pPr lvl="0"/>
             <a:r>
-              <a:rPr lang="en-US" smtClean="0"/>
+              <a:rPr lang="en-US"/>
               <a:t>Click to edit Master text styles</a:t>
             </a:r>
           </a:p>
           <a:p>
             <a:pPr lvl="1"/>
             <a:r>
-              <a:rPr lang="en-US" smtClean="0"/>
+              <a:rPr lang="en-US"/>
               <a:t>Second level</a:t>
             </a:r>
           </a:p>
           <a:p>
             <a:pPr lvl="2"/>
             <a:r>
-              <a:rPr lang="en-US" smtClean="0"/>
+              <a:rPr lang="en-US"/>
               <a:t>Third level</a:t>
             </a:r>
           </a:p>
           <a:p>
             <a:pPr lvl="3"/>
             <a:r>
-              <a:rPr lang="en-US" smtClean="0"/>
+              <a:rPr lang="en-US"/>
               <a:t>Fourth level</a:t>
             </a:r>
           </a:p>
           <a:p>
             <a:pPr lvl="4"/>
             <a:r>
-              <a:rPr lang="en-US" smtClean="0"/>
+              <a:rPr lang="en-US"/>
               <a:t>Fifth level</a:t>
             </a:r>
-            <a:endParaRPr lang="en-US"/>
           </a:p>
         </p:txBody>
       </p:sp>
@@ -2894,7 +2875,7 @@
                   </a:prstClr>
                 </a:solidFill>
               </a:rPr>
-              <a:t>8/13/2015</a:t>
+              <a:t>7/25/2016</a:t>
             </a:fld>
             <a:endParaRPr lang="en-US" dirty="0">
               <a:solidFill>
@@ -2977,13 +2958,6 @@
   <p:clrMapOvr>
     <a:masterClrMapping/>
   </p:clrMapOvr>
-  <p:timing>
-    <p:tnLst>
-      <p:par>
-        <p:cTn id="1" dur="indefinite" restart="never" nodeType="tmRoot"/>
-      </p:par>
-    </p:tnLst>
-  </p:timing>
 </p:sldLayout>
 </file>
 
@@ -3020,10 +2994,9 @@
           <a:lstStyle/>
           <a:p>
             <a:r>
-              <a:rPr lang="en-US" smtClean="0"/>
+              <a:rPr lang="en-US"/>
               <a:t>Click to edit Master title style</a:t>
             </a:r>
-            <a:endParaRPr lang="en-US"/>
           </a:p>
         </p:txBody>
       </p:sp>
@@ -3050,7 +3023,7 @@
                   </a:prstClr>
                 </a:solidFill>
               </a:rPr>
-              <a:t>8/13/2015</a:t>
+              <a:t>7/25/2016</a:t>
             </a:fld>
             <a:endParaRPr lang="en-US">
               <a:solidFill>
@@ -3178,10 +3151,9 @@
           </a:lstStyle>
           <a:p>
             <a:r>
-              <a:rPr lang="en-US" smtClean="0"/>
+              <a:rPr lang="en-US"/>
               <a:t>Click to edit Master title style</a:t>
             </a:r>
-            <a:endParaRPr lang="en-US"/>
           </a:p>
         </p:txBody>
       </p:sp>
@@ -3298,7 +3270,7 @@
           <a:p>
             <a:pPr lvl="0"/>
             <a:r>
-              <a:rPr lang="en-US" smtClean="0"/>
+              <a:rPr lang="en-US"/>
               <a:t>Click to edit Master text styles</a:t>
             </a:r>
           </a:p>
@@ -3327,7 +3299,7 @@
                   </a:prstClr>
                 </a:solidFill>
               </a:rPr>
-              <a:t>8/13/2015</a:t>
+              <a:t>7/25/2016</a:t>
             </a:fld>
             <a:endParaRPr lang="en-US">
               <a:solidFill>
@@ -3446,10 +3418,9 @@
           <a:lstStyle/>
           <a:p>
             <a:r>
-              <a:rPr lang="en-US" smtClean="0"/>
+              <a:rPr lang="en-US"/>
               <a:t>Click to edit Master title style</a:t>
             </a:r>
-            <a:endParaRPr lang="en-US"/>
           </a:p>
         </p:txBody>
       </p:sp>
@@ -3503,38 +3474,37 @@
           <a:p>
             <a:pPr lvl="0"/>
             <a:r>
-              <a:rPr lang="en-US" smtClean="0"/>
+              <a:rPr lang="en-US"/>
               <a:t>Click to edit Master text styles</a:t>
             </a:r>
           </a:p>
           <a:p>
             <a:pPr lvl="1"/>
             <a:r>
-              <a:rPr lang="en-US" smtClean="0"/>
+              <a:rPr lang="en-US"/>
               <a:t>Second level</a:t>
             </a:r>
           </a:p>
           <a:p>
             <a:pPr lvl="2"/>
             <a:r>
-              <a:rPr lang="en-US" smtClean="0"/>
+              <a:rPr lang="en-US"/>
               <a:t>Third level</a:t>
             </a:r>
           </a:p>
           <a:p>
             <a:pPr lvl="3"/>
             <a:r>
-              <a:rPr lang="en-US" smtClean="0"/>
+              <a:rPr lang="en-US"/>
               <a:t>Fourth level</a:t>
             </a:r>
           </a:p>
           <a:p>
             <a:pPr lvl="4"/>
             <a:r>
-              <a:rPr lang="en-US" smtClean="0"/>
+              <a:rPr lang="en-US"/>
               <a:t>Fifth level</a:t>
             </a:r>
-            <a:endParaRPr lang="en-US"/>
           </a:p>
         </p:txBody>
       </p:sp>
@@ -3588,38 +3558,37 @@
           <a:p>
             <a:pPr lvl="0"/>
             <a:r>
-              <a:rPr lang="en-US" smtClean="0"/>
+              <a:rPr lang="en-US"/>
               <a:t>Click to edit Master text styles</a:t>
             </a:r>
           </a:p>
           <a:p>
             <a:pPr lvl="1"/>
             <a:r>
-              <a:rPr lang="en-US" smtClean="0"/>
+              <a:rPr lang="en-US"/>
               <a:t>Second level</a:t>
             </a:r>
           </a:p>
           <a:p>
             <a:pPr lvl="2"/>
             <a:r>
-              <a:rPr lang="en-US" smtClean="0"/>
+              <a:rPr lang="en-US"/>
               <a:t>Third level</a:t>
             </a:r>
           </a:p>
           <a:p>
             <a:pPr lvl="3"/>
             <a:r>
-              <a:rPr lang="en-US" smtClean="0"/>
+              <a:rPr lang="en-US"/>
               <a:t>Fourth level</a:t>
             </a:r>
           </a:p>
           <a:p>
             <a:pPr lvl="4"/>
             <a:r>
-              <a:rPr lang="en-US" smtClean="0"/>
+              <a:rPr lang="en-US"/>
               <a:t>Fifth level</a:t>
             </a:r>
-            <a:endParaRPr lang="en-US"/>
           </a:p>
         </p:txBody>
       </p:sp>
@@ -3646,7 +3615,7 @@
                   </a:prstClr>
                 </a:solidFill>
               </a:rPr>
-              <a:t>8/13/2015</a:t>
+              <a:t>7/25/2016</a:t>
             </a:fld>
             <a:endParaRPr lang="en-US">
               <a:solidFill>
@@ -3769,10 +3738,9 @@
           </a:lstStyle>
           <a:p>
             <a:r>
-              <a:rPr lang="en-US" smtClean="0"/>
+              <a:rPr lang="en-US"/>
               <a:t>Click to edit Master title style</a:t>
             </a:r>
-            <a:endParaRPr lang="en-US"/>
           </a:p>
         </p:txBody>
       </p:sp>
@@ -3835,7 +3803,7 @@
           <a:p>
             <a:pPr lvl="0"/>
             <a:r>
-              <a:rPr lang="en-US" smtClean="0"/>
+              <a:rPr lang="en-US"/>
               <a:t>Click to edit Master text styles</a:t>
             </a:r>
           </a:p>
@@ -3891,38 +3859,37 @@
           <a:p>
             <a:pPr lvl="0"/>
             <a:r>
-              <a:rPr lang="en-US" smtClean="0"/>
+              <a:rPr lang="en-US"/>
               <a:t>Click to edit Master text styles</a:t>
             </a:r>
           </a:p>
           <a:p>
             <a:pPr lvl="1"/>
             <a:r>
-              <a:rPr lang="en-US" smtClean="0"/>
+              <a:rPr lang="en-US"/>
               <a:t>Second level</a:t>
             </a:r>
           </a:p>
           <a:p>
             <a:pPr lvl="2"/>
             <a:r>
-              <a:rPr lang="en-US" smtClean="0"/>
+              <a:rPr lang="en-US"/>
               <a:t>Third level</a:t>
             </a:r>
           </a:p>
           <a:p>
             <a:pPr lvl="3"/>
             <a:r>
-              <a:rPr lang="en-US" smtClean="0"/>
+              <a:rPr lang="en-US"/>
               <a:t>Fourth level</a:t>
             </a:r>
           </a:p>
           <a:p>
             <a:pPr lvl="4"/>
             <a:r>
-              <a:rPr lang="en-US" smtClean="0"/>
+              <a:rPr lang="en-US"/>
               <a:t>Fifth level</a:t>
             </a:r>
-            <a:endParaRPr lang="en-US"/>
           </a:p>
         </p:txBody>
       </p:sp>
@@ -3985,7 +3952,7 @@
           <a:p>
             <a:pPr lvl="0"/>
             <a:r>
-              <a:rPr lang="en-US" smtClean="0"/>
+              <a:rPr lang="en-US"/>
               <a:t>Click to edit Master text styles</a:t>
             </a:r>
           </a:p>
@@ -4041,38 +4008,37 @@
           <a:p>
             <a:pPr lvl="0"/>
             <a:r>
-              <a:rPr lang="en-US" smtClean="0"/>
+              <a:rPr lang="en-US"/>
               <a:t>Click to edit Master text styles</a:t>
             </a:r>
           </a:p>
           <a:p>
             <a:pPr lvl="1"/>
             <a:r>
-              <a:rPr lang="en-US" smtClean="0"/>
+              <a:rPr lang="en-US"/>
               <a:t>Second level</a:t>
             </a:r>
           </a:p>
           <a:p>
             <a:pPr lvl="2"/>
             <a:r>
-              <a:rPr lang="en-US" smtClean="0"/>
+              <a:rPr lang="en-US"/>
               <a:t>Third level</a:t>
             </a:r>
           </a:p>
           <a:p>
             <a:pPr lvl="3"/>
             <a:r>
-              <a:rPr lang="en-US" smtClean="0"/>
+              <a:rPr lang="en-US"/>
               <a:t>Fourth level</a:t>
             </a:r>
           </a:p>
           <a:p>
             <a:pPr lvl="4"/>
             <a:r>
-              <a:rPr lang="en-US" smtClean="0"/>
+              <a:rPr lang="en-US"/>
               <a:t>Fifth level</a:t>
             </a:r>
-            <a:endParaRPr lang="en-US"/>
           </a:p>
         </p:txBody>
       </p:sp>
@@ -4099,7 +4065,7 @@
                   </a:prstClr>
                 </a:solidFill>
               </a:rPr>
-              <a:t>8/13/2015</a:t>
+              <a:t>7/25/2016</a:t>
             </a:fld>
             <a:endParaRPr lang="en-US">
               <a:solidFill>
@@ -4218,10 +4184,9 @@
           <a:lstStyle/>
           <a:p>
             <a:r>
-              <a:rPr lang="en-US" smtClean="0"/>
+              <a:rPr lang="en-US"/>
               <a:t>Click to edit Master title style</a:t>
             </a:r>
-            <a:endParaRPr lang="en-US"/>
           </a:p>
         </p:txBody>
       </p:sp>
@@ -4248,7 +4213,7 @@
                   </a:prstClr>
                 </a:solidFill>
               </a:rPr>
-              <a:t>8/13/2015</a:t>
+              <a:t>7/25/2016</a:t>
             </a:fld>
             <a:endParaRPr lang="en-US">
               <a:solidFill>
@@ -4374,7 +4339,7 @@
                   </a:prstClr>
                 </a:solidFill>
               </a:rPr>
-              <a:t>8/13/2015</a:t>
+              <a:t>7/25/2016</a:t>
             </a:fld>
             <a:endParaRPr lang="en-US">
               <a:solidFill>
@@ -4502,10 +4467,9 @@
           </a:lstStyle>
           <a:p>
             <a:r>
-              <a:rPr lang="en-US" smtClean="0"/>
+              <a:rPr lang="en-US"/>
               <a:t>Click to edit Master title style</a:t>
             </a:r>
-            <a:endParaRPr lang="en-US"/>
           </a:p>
         </p:txBody>
       </p:sp>
@@ -4559,38 +4523,37 @@
           <a:p>
             <a:pPr lvl="0"/>
             <a:r>
-              <a:rPr lang="en-US" smtClean="0"/>
+              <a:rPr lang="en-US"/>
               <a:t>Click to edit Master text styles</a:t>
             </a:r>
           </a:p>
           <a:p>
             <a:pPr lvl="1"/>
             <a:r>
-              <a:rPr lang="en-US" smtClean="0"/>
+              <a:rPr lang="en-US"/>
               <a:t>Second level</a:t>
             </a:r>
           </a:p>
           <a:p>
             <a:pPr lvl="2"/>
             <a:r>
-              <a:rPr lang="en-US" smtClean="0"/>
+              <a:rPr lang="en-US"/>
               <a:t>Third level</a:t>
             </a:r>
           </a:p>
           <a:p>
             <a:pPr lvl="3"/>
             <a:r>
-              <a:rPr lang="en-US" smtClean="0"/>
+              <a:rPr lang="en-US"/>
               <a:t>Fourth level</a:t>
             </a:r>
           </a:p>
           <a:p>
             <a:pPr lvl="4"/>
             <a:r>
-              <a:rPr lang="en-US" smtClean="0"/>
+              <a:rPr lang="en-US"/>
               <a:t>Fifth level</a:t>
             </a:r>
-            <a:endParaRPr lang="en-US"/>
           </a:p>
         </p:txBody>
       </p:sp>
@@ -4653,7 +4616,7 @@
           <a:p>
             <a:pPr lvl="0"/>
             <a:r>
-              <a:rPr lang="en-US" smtClean="0"/>
+              <a:rPr lang="en-US"/>
               <a:t>Click to edit Master text styles</a:t>
             </a:r>
           </a:p>
@@ -4682,7 +4645,7 @@
                   </a:prstClr>
                 </a:solidFill>
               </a:rPr>
-              <a:t>8/13/2015</a:t>
+              <a:t>7/25/2016</a:t>
             </a:fld>
             <a:endParaRPr lang="en-US">
               <a:solidFill>
@@ -4816,10 +4779,9 @@
           <a:lstStyle/>
           <a:p>
             <a:r>
-              <a:rPr lang="en-US" smtClean="0"/>
+              <a:rPr lang="en-US"/>
               <a:t>Click to edit Master title style</a:t>
             </a:r>
-            <a:endParaRPr lang="en-US"/>
           </a:p>
         </p:txBody>
       </p:sp>
@@ -4850,38 +4812,37 @@
           <a:p>
             <a:pPr lvl="0"/>
             <a:r>
-              <a:rPr lang="en-US" smtClean="0"/>
+              <a:rPr lang="en-US"/>
               <a:t>Click to edit Master text styles</a:t>
             </a:r>
           </a:p>
           <a:p>
             <a:pPr lvl="1"/>
             <a:r>
-              <a:rPr lang="en-US" smtClean="0"/>
+              <a:rPr lang="en-US"/>
               <a:t>Second level</a:t>
             </a:r>
           </a:p>
           <a:p>
             <a:pPr lvl="2"/>
             <a:r>
-              <a:rPr lang="en-US" smtClean="0"/>
+              <a:rPr lang="en-US"/>
               <a:t>Third level</a:t>
             </a:r>
           </a:p>
           <a:p>
             <a:pPr lvl="3"/>
             <a:r>
-              <a:rPr lang="en-US" smtClean="0"/>
+              <a:rPr lang="en-US"/>
               <a:t>Fourth level</a:t>
             </a:r>
           </a:p>
           <a:p>
             <a:pPr lvl="4"/>
             <a:r>
-              <a:rPr lang="en-US" smtClean="0"/>
+              <a:rPr lang="en-US"/>
               <a:t>Fifth level</a:t>
             </a:r>
-            <a:endParaRPr lang="en-US"/>
           </a:p>
         </p:txBody>
       </p:sp>
@@ -4926,7 +4887,7 @@
                   </a:prstClr>
                 </a:solidFill>
               </a:rPr>
-              <a:t>8/13/2015</a:t>
+              <a:t>7/25/2016</a:t>
             </a:fld>
             <a:endParaRPr lang="en-US">
               <a:solidFill>
@@ -5057,13 +5018,6 @@
     <p:sldLayoutId id="2147483683" r:id="rId11"/>
     <p:sldLayoutId id="2147483684" r:id="rId12"/>
   </p:sldLayoutIdLst>
-  <p:timing>
-    <p:tnLst>
-      <p:par>
-        <p:cTn id="1" dur="indefinite" restart="never" nodeType="tmRoot"/>
-      </p:par>
-    </p:tnLst>
-  </p:timing>
   <p:hf hdr="0" ftr="0" dt="0"/>
   <p:txStyles>
     <p:titleStyle>
@@ -5345,24 +5299,23 @@
             <p:ph type="ctrTitle"/>
           </p:nvPr>
         </p:nvSpPr>
-        <p:spPr/>
-        <p:txBody>
-          <a:bodyPr/>
-          <a:lstStyle/>
-          <a:p>
-            <a:r>
-              <a:rPr lang="en-US" dirty="0" smtClean="0"/>
-              <a:t>The Point of </a:t>
-            </a:r>
+        <p:spPr>
+          <a:ln w="28575">
+            <a:solidFill>
+              <a:schemeClr val="accent1"/>
+            </a:solidFill>
+          </a:ln>
+        </p:spPr>
+        <p:txBody>
+          <a:bodyPr vert="horz" lIns="91440" tIns="45720" rIns="91440" bIns="45720" rtlCol="0" anchor="ctr">
+            <a:normAutofit/>
+          </a:bodyPr>
+          <a:lstStyle/>
+          <a:p>
             <a:r>
               <a:rPr lang="en-US" dirty="0"/>
-              <a:t>T</a:t>
-            </a:r>
-            <a:r>
-              <a:rPr lang="en-US" dirty="0" smtClean="0"/>
-              <a:t>his Course</a:t>
-            </a:r>
-            <a:endParaRPr lang="en-US" dirty="0"/>
+              <a:t>The Point of This Course</a:t>
+            </a:r>
           </a:p>
         </p:txBody>
       </p:sp>
@@ -5382,16 +5335,15 @@
           <a:lstStyle/>
           <a:p>
             <a:r>
-              <a:rPr lang="en-US" dirty="0" smtClean="0"/>
+              <a:rPr lang="en-US" dirty="0"/>
               <a:t>CS 5010 Program Design Paradigms “Bootcamp”</a:t>
             </a:r>
           </a:p>
           <a:p>
             <a:r>
-              <a:rPr lang="en-US" dirty="0" smtClean="0"/>
+              <a:rPr lang="en-US" dirty="0"/>
               <a:t>Lesson 0.1</a:t>
             </a:r>
-            <a:endParaRPr lang="en-US" dirty="0"/>
           </a:p>
         </p:txBody>
       </p:sp>
@@ -5467,7 +5419,7 @@
                     <a:prstClr val="black"/>
                   </a:solidFill>
                 </a:rPr>
-                <a:t>© Mitchell Wand, 2012-2014</a:t>
+                <a:t>© Mitchell Wand, 2012-2015</a:t>
               </a:r>
             </a:p>
             <a:p>
@@ -5567,13 +5519,6 @@
   <p:clrMapOvr>
     <a:masterClrMapping/>
   </p:clrMapOvr>
-  <p:timing>
-    <p:tnLst>
-      <p:par>
-        <p:cTn id="1" dur="indefinite" restart="never" nodeType="tmRoot"/>
-      </p:par>
-    </p:tnLst>
-  </p:timing>
 </p:sld>
 </file>
 
@@ -5610,10 +5555,9 @@
           <a:lstStyle/>
           <a:p>
             <a:r>
-              <a:rPr lang="en-US" dirty="0" smtClean="0"/>
+              <a:rPr lang="en-US" dirty="0"/>
               <a:t>Principles</a:t>
             </a:r>
-            <a:endParaRPr lang="en-US" dirty="0"/>
           </a:p>
         </p:txBody>
       </p:sp>
@@ -5633,19 +5577,19 @@
           <a:lstStyle/>
           <a:p>
             <a:r>
-              <a:rPr lang="en-US" dirty="0" smtClean="0"/>
+              <a:rPr lang="en-US" dirty="0"/>
               <a:t>Everything we do can be traced back to one or more of these principles.</a:t>
             </a:r>
           </a:p>
           <a:p>
             <a:r>
-              <a:rPr lang="en-US" dirty="0" smtClean="0"/>
+              <a:rPr lang="en-US" dirty="0"/>
               <a:t>We will expand on each of them as we go along.</a:t>
             </a:r>
           </a:p>
           <a:p>
             <a:r>
-              <a:rPr lang="en-US" dirty="0" smtClean="0"/>
+              <a:rPr lang="en-US" dirty="0"/>
               <a:t>Write these down, in your own handwriting.  Writing things down will help you remember them.</a:t>
             </a:r>
           </a:p>
@@ -5688,13 +5632,6 @@
   <p:clrMapOvr>
     <a:masterClrMapping/>
   </p:clrMapOvr>
-  <p:timing>
-    <p:tnLst>
-      <p:par>
-        <p:cTn id="1" dur="indefinite" restart="never" nodeType="tmRoot"/>
-      </p:par>
-    </p:tnLst>
-  </p:timing>
 </p:sld>
 </file>
 
@@ -5731,10 +5668,9 @@
           <a:lstStyle/>
           <a:p>
             <a:r>
-              <a:rPr lang="en-US" dirty="0" smtClean="0"/>
+              <a:rPr lang="en-US" dirty="0"/>
               <a:t>A Few of Our Slogans</a:t>
             </a:r>
-            <a:endParaRPr lang="en-US" dirty="0"/>
           </a:p>
         </p:txBody>
       </p:sp>
@@ -5759,28 +5695,18 @@
               <a:rPr lang="en-US" dirty="0"/>
               <a:t>We are also big on slogans.  We think they help focus your mind. </a:t>
             </a:r>
-            <a:endParaRPr lang="en-US" dirty="0" smtClean="0"/>
-          </a:p>
-          <a:p>
-            <a:r>
-              <a:rPr lang="en-US" dirty="0" smtClean="0"/>
-              <a:t>Here </a:t>
-            </a:r>
+          </a:p>
+          <a:p>
             <a:r>
               <a:rPr lang="en-US" dirty="0"/>
-              <a:t>are our first few slogans</a:t>
-            </a:r>
-            <a:r>
-              <a:rPr lang="en-US" dirty="0" smtClean="0"/>
-              <a:t>.  You should write them down, too, in your own handwriting.</a:t>
-            </a:r>
-          </a:p>
-          <a:p>
-            <a:r>
-              <a:rPr lang="en-US" dirty="0" smtClean="0"/>
+              <a:t>Here are our first few slogans.  You should write them down, too, in your own handwriting.</a:t>
+            </a:r>
+          </a:p>
+          <a:p>
+            <a:r>
+              <a:rPr lang="en-US" dirty="0"/>
               <a:t>In fact, whenever you see one of these blue tables, you should assume that this is something important, and you should probably write it down in your own handwriting so you can memorize it.</a:t>
             </a:r>
-            <a:endParaRPr lang="en-US" dirty="0"/>
           </a:p>
           <a:p>
             <a:endParaRPr lang="en-US" dirty="0"/>
@@ -5821,13 +5747,6 @@
   <p:clrMapOvr>
     <a:masterClrMapping/>
   </p:clrMapOvr>
-  <p:timing>
-    <p:tnLst>
-      <p:par>
-        <p:cTn id="1" dur="indefinite" restart="never" nodeType="tmRoot"/>
-      </p:par>
-    </p:tnLst>
-  </p:timing>
 </p:sld>
 </file>
 
@@ -5870,7 +5789,13 @@
                 <a:tableStyleId>{5C22544A-7EE6-4342-B048-85BDC9FD1C3A}</a:tableStyleId>
               </a:tblPr>
               <a:tblGrid>
-                <a:gridCol w="8229600"/>
+                <a:gridCol w="8229600">
+                  <a:extLst>
+                    <a:ext uri="{9D8B030D-6E8A-4147-A177-3AD203B41FA5}">
+                      <a16:colId xmlns:a16="http://schemas.microsoft.com/office/drawing/2014/main" val="20000"/>
+                    </a:ext>
+                  </a:extLst>
+                </a:gridCol>
               </a:tblGrid>
               <a:tr h="370840">
                 <a:tc>
@@ -5880,14 +5805,18 @@
                     <a:p>
                       <a:pPr algn="ctr"/>
                       <a:r>
-                        <a:rPr lang="en-US" sz="3200" dirty="0" smtClean="0"/>
+                        <a:rPr lang="en-US" sz="3200" dirty="0"/>
                         <a:t>Some Slogans</a:t>
                       </a:r>
-                      <a:endParaRPr lang="en-US" sz="3200" dirty="0"/>
                     </a:p>
                   </a:txBody>
                   <a:tcPr/>
                 </a:tc>
+                <a:extLst>
+                  <a:ext uri="{0D108BD9-81ED-4DB2-BD59-A6C34878D82A}">
+                    <a16:rowId xmlns:a16="http://schemas.microsoft.com/office/drawing/2014/main" val="10000"/>
+                  </a:ext>
+                </a:extLst>
               </a:tr>
               <a:tr h="370840">
                 <a:tc>
@@ -5896,14 +5825,18 @@
                     <a:lstStyle/>
                     <a:p>
                       <a:r>
-                        <a:rPr lang="en-US" sz="3200" dirty="0" smtClean="0"/>
+                        <a:rPr lang="en-US" sz="3200" dirty="0"/>
                         <a:t>1. Stick to the recipe!</a:t>
                       </a:r>
-                      <a:endParaRPr lang="en-US" sz="3200" dirty="0"/>
                     </a:p>
                   </a:txBody>
                   <a:tcPr/>
                 </a:tc>
+                <a:extLst>
+                  <a:ext uri="{0D108BD9-81ED-4DB2-BD59-A6C34878D82A}">
+                    <a16:rowId xmlns:a16="http://schemas.microsoft.com/office/drawing/2014/main" val="10001"/>
+                  </a:ext>
+                </a:extLst>
               </a:tr>
               <a:tr h="289560">
                 <a:tc>
@@ -5929,18 +5862,23 @@
                         <a:defRPr/>
                       </a:pPr>
                       <a:r>
-                        <a:rPr lang="en-US" sz="3200" dirty="0" smtClean="0"/>
+                        <a:rPr lang="en-US" sz="3200" dirty="0"/>
                         <a:t>2. You</a:t>
                       </a:r>
                       <a:r>
-                        <a:rPr lang="en-US" sz="3200" baseline="0" dirty="0" smtClean="0"/>
+                        <a:rPr lang="en-US" sz="3200" baseline="0" dirty="0"/>
                         <a:t> don't understand it until you can give an example.</a:t>
                       </a:r>
-                      <a:endParaRPr lang="en-US" sz="3200" dirty="0" smtClean="0"/>
+                      <a:endParaRPr lang="en-US" sz="3200" dirty="0"/>
                     </a:p>
                   </a:txBody>
                   <a:tcPr/>
                 </a:tc>
+                <a:extLst>
+                  <a:ext uri="{0D108BD9-81ED-4DB2-BD59-A6C34878D82A}">
+                    <a16:rowId xmlns:a16="http://schemas.microsoft.com/office/drawing/2014/main" val="10002"/>
+                  </a:ext>
+                </a:extLst>
               </a:tr>
               <a:tr h="289560">
                 <a:tc>
@@ -5966,18 +5904,23 @@
                         <a:defRPr/>
                       </a:pPr>
                       <a:r>
-                        <a:rPr lang="en-US" sz="3200" dirty="0" smtClean="0"/>
+                        <a:rPr lang="en-US" sz="3200" dirty="0"/>
                         <a:t>3. One</a:t>
                       </a:r>
                       <a:r>
-                        <a:rPr lang="en-US" sz="3200" baseline="0" dirty="0" smtClean="0"/>
+                        <a:rPr lang="en-US" sz="3200" baseline="0" dirty="0"/>
                         <a:t> function, one task.</a:t>
                       </a:r>
-                      <a:endParaRPr lang="en-US" sz="3200" dirty="0" smtClean="0"/>
+                      <a:endParaRPr lang="en-US" sz="3200" dirty="0"/>
                     </a:p>
                   </a:txBody>
                   <a:tcPr/>
                 </a:tc>
+                <a:extLst>
+                  <a:ext uri="{0D108BD9-81ED-4DB2-BD59-A6C34878D82A}">
+                    <a16:rowId xmlns:a16="http://schemas.microsoft.com/office/drawing/2014/main" val="10003"/>
+                  </a:ext>
+                </a:extLst>
               </a:tr>
               <a:tr h="370840">
                 <a:tc>
@@ -5986,11 +5929,11 @@
                     <a:lstStyle/>
                     <a:p>
                       <a:r>
-                        <a:rPr lang="en-US" sz="3200" dirty="0" smtClean="0"/>
+                        <a:rPr lang="en-US" sz="3200" dirty="0"/>
                         <a:t>4.</a:t>
                       </a:r>
                       <a:r>
-                        <a:rPr lang="en-US" sz="3200" baseline="0" dirty="0" smtClean="0"/>
+                        <a:rPr lang="en-US" sz="3200" baseline="0" dirty="0"/>
                         <a:t> The Shape of the Data Determines the Shape of the Program.</a:t>
                       </a:r>
                       <a:endParaRPr lang="en-US" sz="3200" dirty="0"/>
@@ -5998,6 +5941,11 @@
                   </a:txBody>
                   <a:tcPr/>
                 </a:tc>
+                <a:extLst>
+                  <a:ext uri="{0D108BD9-81ED-4DB2-BD59-A6C34878D82A}">
+                    <a16:rowId xmlns:a16="http://schemas.microsoft.com/office/drawing/2014/main" val="10004"/>
+                  </a:ext>
+                </a:extLst>
               </a:tr>
               <a:tr h="370840">
                 <a:tc>
@@ -6023,18 +5971,23 @@
                         <a:defRPr/>
                       </a:pPr>
                       <a:r>
-                        <a:rPr lang="en-US" sz="3200" dirty="0" smtClean="0"/>
+                        <a:rPr lang="en-US" sz="3200" dirty="0"/>
                         <a:t>5. Practice</a:t>
                       </a:r>
                       <a:r>
-                        <a:rPr lang="en-US" sz="3200" baseline="0" dirty="0" smtClean="0"/>
+                        <a:rPr lang="en-US" sz="3200" baseline="0" dirty="0"/>
                         <a:t> makes perfect.</a:t>
                       </a:r>
-                      <a:endParaRPr lang="en-US" sz="3200" dirty="0" smtClean="0"/>
+                      <a:endParaRPr lang="en-US" sz="3200" dirty="0"/>
                     </a:p>
                   </a:txBody>
                   <a:tcPr/>
                 </a:tc>
+                <a:extLst>
+                  <a:ext uri="{0D108BD9-81ED-4DB2-BD59-A6C34878D82A}">
+                    <a16:rowId xmlns:a16="http://schemas.microsoft.com/office/drawing/2014/main" val="10005"/>
+                  </a:ext>
+                </a:extLst>
               </a:tr>
             </a:tbl>
           </a:graphicData>
@@ -6086,13 +6039,6 @@
   <p:clrMapOvr>
     <a:masterClrMapping/>
   </p:clrMapOvr>
-  <p:timing>
-    <p:tnLst>
-      <p:par>
-        <p:cTn id="1" dur="indefinite" restart="never" nodeType="tmRoot"/>
-      </p:par>
-    </p:tnLst>
-  </p:timing>
 </p:sld>
 </file>
 
@@ -6129,10 +6075,9 @@
           <a:lstStyle/>
           <a:p>
             <a:r>
-              <a:rPr lang="en-US" dirty="0" smtClean="0"/>
+              <a:rPr lang="en-US" dirty="0"/>
               <a:t>The Function Design Recipe</a:t>
             </a:r>
-            <a:endParaRPr lang="en-US" dirty="0"/>
           </a:p>
         </p:txBody>
       </p:sp>
@@ -6155,38 +6100,26 @@
           <a:p>
             <a:r>
               <a:rPr lang="en-US" dirty="0"/>
-              <a:t>The function design recipe is the most important thing in this course.  It is the basis for everything we do</a:t>
-            </a:r>
-            <a:r>
-              <a:rPr lang="en-US" dirty="0" smtClean="0"/>
-              <a:t>.</a:t>
-            </a:r>
-            <a:endParaRPr lang="en-US" dirty="0"/>
+              <a:t>The function design recipe is the most important thing in this course.  It is the basis for everything we do.</a:t>
+            </a:r>
           </a:p>
           <a:p>
             <a:r>
               <a:rPr lang="en-US" dirty="0"/>
-              <a:t>It will give you a framework for attacking any programming problem, in any language.  Indeed, students have reported that they have found it useful in other courses, and even in their everyday life</a:t>
-            </a:r>
-            <a:r>
-              <a:rPr lang="en-US" dirty="0" smtClean="0"/>
-              <a:t>.</a:t>
-            </a:r>
-            <a:endParaRPr lang="en-US" dirty="0"/>
+              <a:t>It will give you a framework for attacking any programming problem, in any language.  Indeed, students have reported that they have found it useful in other courses, and even in their everyday life.</a:t>
+            </a:r>
           </a:p>
           <a:p>
             <a:r>
               <a:rPr lang="en-US" dirty="0"/>
               <a:t>With the recipe, you need never stare at an empty sheet of paper again. </a:t>
             </a:r>
-            <a:endParaRPr lang="en-US" dirty="0" smtClean="0"/>
-          </a:p>
-          <a:p>
-            <a:r>
-              <a:rPr lang="en-US" dirty="0" smtClean="0"/>
+          </a:p>
+          <a:p>
+            <a:r>
+              <a:rPr lang="en-US" dirty="0"/>
               <a:t>Here it is:</a:t>
             </a:r>
-            <a:endParaRPr lang="en-US" dirty="0"/>
           </a:p>
         </p:txBody>
       </p:sp>
@@ -6224,13 +6157,6 @@
   <p:clrMapOvr>
     <a:masterClrMapping/>
   </p:clrMapOvr>
-  <p:timing>
-    <p:tnLst>
-      <p:par>
-        <p:cTn id="1" dur="indefinite" restart="never" nodeType="tmRoot"/>
-      </p:par>
-    </p:tnLst>
-  </p:timing>
 </p:sld>
 </file>
 
@@ -6267,10 +6193,9 @@
           <a:lstStyle/>
           <a:p>
             <a:r>
-              <a:rPr lang="en-US" dirty="0" smtClean="0"/>
+              <a:rPr lang="en-US" dirty="0"/>
               <a:t>The Function Design Recipe</a:t>
             </a:r>
-            <a:endParaRPr lang="en-US" dirty="0"/>
           </a:p>
         </p:txBody>
       </p:sp>
@@ -6296,7 +6221,13 @@
                 <a:tableStyleId>{5C22544A-7EE6-4342-B048-85BDC9FD1C3A}</a:tableStyleId>
               </a:tblPr>
               <a:tblGrid>
-                <a:gridCol w="8229600"/>
+                <a:gridCol w="8229600">
+                  <a:extLst>
+                    <a:ext uri="{9D8B030D-6E8A-4147-A177-3AD203B41FA5}">
+                      <a16:colId xmlns:a16="http://schemas.microsoft.com/office/drawing/2014/main" val="20000"/>
+                    </a:ext>
+                  </a:extLst>
+                </a:gridCol>
               </a:tblGrid>
               <a:tr h="370840">
                 <a:tc>
@@ -6306,14 +6237,18 @@
                     <a:p>
                       <a:pPr algn="ctr"/>
                       <a:r>
-                        <a:rPr lang="en-US" sz="3200" dirty="0" smtClean="0"/>
+                        <a:rPr lang="en-US" sz="3200" dirty="0"/>
                         <a:t>The Function Design Recipe</a:t>
                       </a:r>
-                      <a:endParaRPr lang="en-US" sz="3200" dirty="0"/>
                     </a:p>
                   </a:txBody>
                   <a:tcPr/>
                 </a:tc>
+                <a:extLst>
+                  <a:ext uri="{0D108BD9-81ED-4DB2-BD59-A6C34878D82A}">
+                    <a16:rowId xmlns:a16="http://schemas.microsoft.com/office/drawing/2014/main" val="10000"/>
+                  </a:ext>
+                </a:extLst>
               </a:tr>
               <a:tr h="370840">
                 <a:tc>
@@ -6322,14 +6257,18 @@
                     <a:lstStyle/>
                     <a:p>
                       <a:r>
-                        <a:rPr lang="en-US" sz="3200" dirty="0" smtClean="0"/>
+                        <a:rPr lang="en-US" sz="3200" dirty="0"/>
                         <a:t>1. Data Design</a:t>
                       </a:r>
-                      <a:endParaRPr lang="en-US" sz="3200" dirty="0"/>
                     </a:p>
                   </a:txBody>
                   <a:tcPr/>
                 </a:tc>
+                <a:extLst>
+                  <a:ext uri="{0D108BD9-81ED-4DB2-BD59-A6C34878D82A}">
+                    <a16:rowId xmlns:a16="http://schemas.microsoft.com/office/drawing/2014/main" val="10001"/>
+                  </a:ext>
+                </a:extLst>
               </a:tr>
               <a:tr h="370840">
                 <a:tc>
@@ -6338,14 +6277,18 @@
                     <a:lstStyle/>
                     <a:p>
                       <a:r>
-                        <a:rPr lang="en-US" sz="3200" dirty="0" smtClean="0"/>
+                        <a:rPr lang="en-US" sz="3200" dirty="0"/>
                         <a:t>2. Contract and Purpose Statement</a:t>
                       </a:r>
-                      <a:endParaRPr lang="en-US" sz="3200" dirty="0"/>
                     </a:p>
                   </a:txBody>
                   <a:tcPr/>
                 </a:tc>
+                <a:extLst>
+                  <a:ext uri="{0D108BD9-81ED-4DB2-BD59-A6C34878D82A}">
+                    <a16:rowId xmlns:a16="http://schemas.microsoft.com/office/drawing/2014/main" val="10002"/>
+                  </a:ext>
+                </a:extLst>
               </a:tr>
               <a:tr h="370840">
                 <a:tc>
@@ -6354,11 +6297,11 @@
                     <a:lstStyle/>
                     <a:p>
                       <a:r>
-                        <a:rPr lang="en-US" sz="3200" dirty="0" smtClean="0"/>
+                        <a:rPr lang="en-US" sz="3200" dirty="0"/>
                         <a:t>3.</a:t>
                       </a:r>
                       <a:r>
-                        <a:rPr lang="en-US" sz="3200" baseline="0" dirty="0" smtClean="0"/>
+                        <a:rPr lang="en-US" sz="3200" baseline="0" dirty="0"/>
                         <a:t> Examples and Tests</a:t>
                       </a:r>
                       <a:endParaRPr lang="en-US" sz="3200" dirty="0"/>
@@ -6366,6 +6309,11 @@
                   </a:txBody>
                   <a:tcPr/>
                 </a:tc>
+                <a:extLst>
+                  <a:ext uri="{0D108BD9-81ED-4DB2-BD59-A6C34878D82A}">
+                    <a16:rowId xmlns:a16="http://schemas.microsoft.com/office/drawing/2014/main" val="10003"/>
+                  </a:ext>
+                </a:extLst>
               </a:tr>
               <a:tr h="370840">
                 <a:tc>
@@ -6374,13 +6322,18 @@
                     <a:lstStyle/>
                     <a:p>
                       <a:r>
-                        <a:rPr lang="en-US" sz="3200" dirty="0" smtClean="0"/>
+                        <a:rPr lang="en-US" sz="3200" dirty="0"/>
                         <a:t>4. Design Strategy</a:t>
                       </a:r>
                     </a:p>
                   </a:txBody>
                   <a:tcPr/>
                 </a:tc>
+                <a:extLst>
+                  <a:ext uri="{0D108BD9-81ED-4DB2-BD59-A6C34878D82A}">
+                    <a16:rowId xmlns:a16="http://schemas.microsoft.com/office/drawing/2014/main" val="10004"/>
+                  </a:ext>
+                </a:extLst>
               </a:tr>
               <a:tr h="370840">
                 <a:tc>
@@ -6389,14 +6342,18 @@
                     <a:lstStyle/>
                     <a:p>
                       <a:r>
-                        <a:rPr lang="en-US" sz="3200" dirty="0" smtClean="0"/>
+                        <a:rPr lang="en-US" sz="3200" dirty="0"/>
                         <a:t>5. Function Definition</a:t>
                       </a:r>
-                      <a:endParaRPr lang="en-US" sz="3200" dirty="0"/>
                     </a:p>
                   </a:txBody>
                   <a:tcPr/>
                 </a:tc>
+                <a:extLst>
+                  <a:ext uri="{0D108BD9-81ED-4DB2-BD59-A6C34878D82A}">
+                    <a16:rowId xmlns:a16="http://schemas.microsoft.com/office/drawing/2014/main" val="10005"/>
+                  </a:ext>
+                </a:extLst>
               </a:tr>
               <a:tr h="370840">
                 <a:tc>
@@ -6405,11 +6362,11 @@
                     <a:lstStyle/>
                     <a:p>
                       <a:r>
-                        <a:rPr lang="en-US" sz="3200" dirty="0" smtClean="0"/>
+                        <a:rPr lang="en-US" sz="3200" dirty="0"/>
                         <a:t>6. Program</a:t>
                       </a:r>
                       <a:r>
-                        <a:rPr lang="en-US" sz="3200" baseline="0" dirty="0" smtClean="0"/>
+                        <a:rPr lang="en-US" sz="3200" baseline="0" dirty="0"/>
                         <a:t> Review</a:t>
                       </a:r>
                       <a:endParaRPr lang="en-US" sz="3200" dirty="0"/>
@@ -6417,6 +6374,11 @@
                   </a:txBody>
                   <a:tcPr/>
                 </a:tc>
+                <a:extLst>
+                  <a:ext uri="{0D108BD9-81ED-4DB2-BD59-A6C34878D82A}">
+                    <a16:rowId xmlns:a16="http://schemas.microsoft.com/office/drawing/2014/main" val="10006"/>
+                  </a:ext>
+                </a:extLst>
               </a:tr>
             </a:tbl>
           </a:graphicData>
@@ -6473,10 +6435,9 @@
           <a:lstStyle/>
           <a:p>
             <a:r>
-              <a:rPr lang="en-US" sz="2000" i="1" dirty="0" smtClean="0"/>
+              <a:rPr lang="en-US" sz="2000" i="1" dirty="0"/>
               <a:t>This is important.  Write it down, in your own handwriting.  Keep it with you at all times.  Put it on your mirror.  Put it under your pillow.  I’m not kidding!</a:t>
             </a:r>
-            <a:endParaRPr lang="en-US" sz="2000" i="1" dirty="0"/>
           </a:p>
         </p:txBody>
       </p:sp>
@@ -6673,10 +6634,9 @@
           <a:lstStyle/>
           <a:p>
             <a:r>
-              <a:rPr lang="en-US" dirty="0" smtClean="0"/>
+              <a:rPr lang="en-US" dirty="0"/>
               <a:t>The Course Map</a:t>
             </a:r>
-            <a:endParaRPr lang="en-US" dirty="0"/>
           </a:p>
         </p:txBody>
       </p:sp>
@@ -6697,15 +6657,7 @@
           <a:p>
             <a:r>
               <a:rPr lang="en-US" dirty="0"/>
-              <a:t>As we go through the course, we will learn about more and more complicated kinds of data design and design strategies.  </a:t>
-            </a:r>
-            <a:r>
-              <a:rPr lang="en-US" dirty="0" smtClean="0"/>
-              <a:t>The map on the next slide, </a:t>
-            </a:r>
-            <a:r>
-              <a:rPr lang="en-US" dirty="0"/>
-              <a:t>which we will show at the beginning of every module, will help you see where you are in the course content.</a:t>
+              <a:t>As we go through the course, we will learn about more and more complicated kinds of data design and design strategies.  The map on the next slide, which we will show at the beginning of every module, will help you see where you are in the course content.</a:t>
             </a:r>
           </a:p>
           <a:p>
@@ -6814,10 +6766,9 @@
           <a:p>
             <a:pPr algn="ctr"/>
             <a:r>
-              <a:rPr lang="en-US" dirty="0" smtClean="0"/>
+              <a:rPr lang="en-US" dirty="0"/>
               <a:t>Generalization</a:t>
             </a:r>
-            <a:endParaRPr lang="en-US" dirty="0"/>
           </a:p>
         </p:txBody>
       </p:sp>
@@ -6862,10 +6813,9 @@
           <a:p>
             <a:pPr algn="ctr"/>
             <a:r>
-              <a:rPr lang="en-US" dirty="0" smtClean="0"/>
+              <a:rPr lang="en-US" dirty="0"/>
               <a:t>Over Constants</a:t>
             </a:r>
-            <a:endParaRPr lang="en-US" dirty="0"/>
           </a:p>
         </p:txBody>
       </p:sp>
@@ -6910,7 +6860,7 @@
           <a:p>
             <a:pPr algn="ctr"/>
             <a:r>
-              <a:rPr lang="en-US" dirty="0" smtClean="0"/>
+              <a:rPr lang="en-US" dirty="0"/>
               <a:t>Over Expressions</a:t>
             </a:r>
           </a:p>
@@ -6957,10 +6907,9 @@
           <a:p>
             <a:pPr algn="ctr"/>
             <a:r>
-              <a:rPr lang="en-US" dirty="0" smtClean="0"/>
+              <a:rPr lang="en-US" dirty="0"/>
               <a:t>Over Contexts</a:t>
             </a:r>
-            <a:endParaRPr lang="en-US" dirty="0"/>
           </a:p>
         </p:txBody>
       </p:sp>
@@ -7005,10 +6954,9 @@
           <a:p>
             <a:pPr algn="ctr"/>
             <a:r>
-              <a:rPr lang="en-US" dirty="0" smtClean="0"/>
+              <a:rPr lang="en-US" dirty="0"/>
               <a:t>Over Data Representations</a:t>
             </a:r>
-            <a:endParaRPr lang="en-US" dirty="0"/>
           </a:p>
         </p:txBody>
       </p:sp>
@@ -7053,10 +7001,9 @@
           <a:p>
             <a:pPr algn="ctr"/>
             <a:r>
-              <a:rPr lang="en-US" dirty="0" smtClean="0"/>
+              <a:rPr lang="en-US" dirty="0"/>
               <a:t>Over Method Implementations</a:t>
             </a:r>
-            <a:endParaRPr lang="en-US" dirty="0"/>
           </a:p>
         </p:txBody>
       </p:sp>
@@ -7115,10 +7062,9 @@
             <a:p>
               <a:pPr algn="ctr"/>
               <a:r>
-                <a:rPr lang="en-US" dirty="0" smtClean="0"/>
+                <a:rPr lang="en-US" dirty="0"/>
                 <a:t>Mixed Data</a:t>
               </a:r>
-              <a:endParaRPr lang="en-US" dirty="0"/>
             </a:p>
           </p:txBody>
         </p:sp>
@@ -7157,10 +7103,9 @@
             <a:p>
               <a:pPr algn="ctr"/>
               <a:r>
-                <a:rPr lang="en-US" dirty="0" smtClean="0"/>
+                <a:rPr lang="en-US" dirty="0"/>
                 <a:t>Data Representations</a:t>
               </a:r>
-              <a:endParaRPr lang="en-US" dirty="0"/>
             </a:p>
           </p:txBody>
         </p:sp>
@@ -7205,10 +7150,9 @@
             <a:p>
               <a:pPr algn="ctr"/>
               <a:r>
-                <a:rPr lang="en-US" dirty="0" smtClean="0"/>
+                <a:rPr lang="en-US" dirty="0"/>
                 <a:t>Basics</a:t>
               </a:r>
-              <a:endParaRPr lang="en-US" dirty="0"/>
             </a:p>
           </p:txBody>
         </p:sp>
@@ -7253,10 +7197,9 @@
             <a:p>
               <a:pPr algn="ctr"/>
               <a:r>
-                <a:rPr lang="en-US" dirty="0" smtClean="0"/>
+                <a:rPr lang="en-US" dirty="0"/>
                 <a:t>Recursive Data</a:t>
               </a:r>
-              <a:endParaRPr lang="en-US" dirty="0"/>
             </a:p>
           </p:txBody>
         </p:sp>
@@ -7301,10 +7244,9 @@
             <a:p>
               <a:pPr algn="ctr"/>
               <a:r>
-                <a:rPr lang="en-US" dirty="0" smtClean="0"/>
+                <a:rPr lang="en-US" dirty="0"/>
                 <a:t>Functional Data</a:t>
               </a:r>
-              <a:endParaRPr lang="en-US" dirty="0"/>
             </a:p>
           </p:txBody>
         </p:sp>
@@ -7349,10 +7291,9 @@
             <a:p>
               <a:pPr algn="ctr"/>
               <a:r>
-                <a:rPr lang="en-US" dirty="0" smtClean="0"/>
+                <a:rPr lang="en-US" dirty="0"/>
                 <a:t>Objects &amp; Classes</a:t>
               </a:r>
-              <a:endParaRPr lang="en-US" dirty="0"/>
             </a:p>
           </p:txBody>
         </p:sp>
@@ -7397,14 +7338,13 @@
             <a:p>
               <a:pPr algn="ctr"/>
               <a:r>
-                <a:rPr lang="en-US" dirty="0" err="1" smtClean="0"/>
+                <a:rPr lang="en-US" dirty="0" err="1"/>
                 <a:t>Stateful</a:t>
               </a:r>
               <a:r>
-                <a:rPr lang="en-US" dirty="0" smtClean="0"/>
+                <a:rPr lang="en-US" dirty="0"/>
                 <a:t> Objects</a:t>
               </a:r>
-              <a:endParaRPr lang="en-US" dirty="0"/>
             </a:p>
           </p:txBody>
         </p:sp>
@@ -7530,10 +7470,9 @@
             <a:p>
               <a:pPr algn="ctr"/>
               <a:r>
-                <a:rPr lang="en-US" dirty="0" smtClean="0"/>
+                <a:rPr lang="en-US" dirty="0"/>
                 <a:t>Design Strategies</a:t>
               </a:r>
-              <a:endParaRPr lang="en-US" dirty="0"/>
             </a:p>
           </p:txBody>
         </p:sp>
@@ -7578,10 +7517,9 @@
             <a:p>
               <a:pPr algn="ctr"/>
               <a:r>
-                <a:rPr lang="en-US" dirty="0" smtClean="0"/>
+                <a:rPr lang="en-US" dirty="0"/>
                 <a:t>Combine simpler functions</a:t>
               </a:r>
-              <a:endParaRPr lang="en-US" dirty="0"/>
             </a:p>
           </p:txBody>
         </p:sp>
@@ -7626,10 +7564,9 @@
             <a:p>
               <a:pPr algn="ctr"/>
               <a:r>
-                <a:rPr lang="en-US" dirty="0" smtClean="0"/>
+                <a:rPr lang="en-US" dirty="0"/>
                 <a:t>Use a template</a:t>
               </a:r>
-              <a:endParaRPr lang="en-US" dirty="0"/>
             </a:p>
           </p:txBody>
         </p:sp>
@@ -7674,10 +7611,9 @@
             <a:p>
               <a:pPr algn="ctr"/>
               <a:r>
-                <a:rPr lang="en-US" dirty="0" smtClean="0"/>
+                <a:rPr lang="en-US" dirty="0"/>
                 <a:t>Divide into Cases</a:t>
               </a:r>
-              <a:endParaRPr lang="en-US" dirty="0"/>
             </a:p>
           </p:txBody>
         </p:sp>
@@ -7722,10 +7658,9 @@
             <a:p>
               <a:pPr algn="ctr"/>
               <a:r>
-                <a:rPr lang="en-US" dirty="0" smtClean="0"/>
+                <a:rPr lang="en-US" dirty="0"/>
                 <a:t>Call a more general function</a:t>
               </a:r>
-              <a:endParaRPr lang="en-US" dirty="0"/>
             </a:p>
           </p:txBody>
         </p:sp>
@@ -7770,14 +7705,9 @@
             <a:p>
               <a:pPr algn="ctr"/>
               <a:r>
-                <a:rPr lang="en-US" dirty="0" smtClean="0"/>
-                <a:t>Communicate </a:t>
+                <a:rPr lang="en-US" dirty="0"/>
+                <a:t>Communicate via State</a:t>
               </a:r>
-              <a:r>
-                <a:rPr lang="en-US" dirty="0" smtClean="0"/>
-                <a:t>via State</a:t>
-              </a:r>
-              <a:endParaRPr lang="en-US" dirty="0"/>
             </a:p>
           </p:txBody>
         </p:sp>
@@ -8342,13 +8272,6 @@
   <p:clrMapOvr>
     <a:masterClrMapping/>
   </p:clrMapOvr>
-  <p:timing>
-    <p:tnLst>
-      <p:par>
-        <p:cTn id="1" dur="indefinite" restart="never" nodeType="tmRoot"/>
-      </p:par>
-    </p:tnLst>
-  </p:timing>
 </p:sld>
 </file>
 
@@ -8385,10 +8308,9 @@
           <a:lstStyle/>
           <a:p>
             <a:r>
-              <a:rPr lang="en-US" dirty="0" smtClean="0"/>
+              <a:rPr lang="en-US" dirty="0"/>
               <a:t>Next Steps</a:t>
             </a:r>
-            <a:endParaRPr lang="en-US" dirty="0"/>
           </a:p>
         </p:txBody>
       </p:sp>
@@ -8408,16 +8330,15 @@
           <a:lstStyle/>
           <a:p>
             <a:r>
-              <a:rPr lang="en-US" dirty="0" smtClean="0"/>
+              <a:rPr lang="en-US" dirty="0"/>
               <a:t>If you have questions about this lesson, ask them on Piazza</a:t>
             </a:r>
           </a:p>
           <a:p>
             <a:r>
-              <a:rPr lang="en-US" dirty="0" smtClean="0"/>
+              <a:rPr lang="en-US" dirty="0"/>
               <a:t>Go on to the next lesson</a:t>
             </a:r>
-            <a:endParaRPr lang="en-US" dirty="0"/>
           </a:p>
         </p:txBody>
       </p:sp>
@@ -8467,13 +8388,6 @@
   <p:clrMapOvr>
     <a:masterClrMapping/>
   </p:clrMapOvr>
-  <p:timing>
-    <p:tnLst>
-      <p:par>
-        <p:cTn id="1" dur="indefinite" restart="never" nodeType="tmRoot"/>
-      </p:par>
-    </p:tnLst>
-  </p:timing>
 </p:sld>
 </file>
 
@@ -8510,10 +8424,9 @@
           <a:lstStyle/>
           <a:p>
             <a:r>
-              <a:rPr lang="en-US" dirty="0" smtClean="0"/>
+              <a:rPr lang="en-US" dirty="0"/>
               <a:t>Learning Objectives</a:t>
             </a:r>
-            <a:endParaRPr lang="en-US" dirty="0"/>
           </a:p>
         </p:txBody>
       </p:sp>
@@ -8533,43 +8446,43 @@
           <a:lstStyle/>
           <a:p>
             <a:r>
-              <a:rPr lang="en-US" dirty="0" smtClean="0"/>
+              <a:rPr lang="en-US" dirty="0"/>
               <a:t>By the time you complete this lesson, you should be able to :</a:t>
             </a:r>
           </a:p>
           <a:p>
             <a:pPr lvl="1"/>
             <a:r>
-              <a:rPr lang="en-US" dirty="0" smtClean="0"/>
+              <a:rPr lang="en-US" dirty="0"/>
               <a:t>Explain </a:t>
             </a:r>
             <a:r>
-              <a:rPr lang="en-US" b="1" dirty="0" smtClean="0"/>
+              <a:rPr lang="en-US" b="1" dirty="0"/>
               <a:t>the point </a:t>
             </a:r>
             <a:r>
-              <a:rPr lang="en-US" dirty="0" smtClean="0"/>
+              <a:rPr lang="en-US" dirty="0"/>
               <a:t>of the course</a:t>
             </a:r>
           </a:p>
           <a:p>
             <a:pPr lvl="1"/>
             <a:r>
-              <a:rPr lang="en-US" dirty="0" smtClean="0"/>
+              <a:rPr lang="en-US" dirty="0"/>
               <a:t>list the 6 principles for writing beautiful programs</a:t>
             </a:r>
           </a:p>
           <a:p>
             <a:pPr lvl="1"/>
             <a:r>
-              <a:rPr lang="en-US" dirty="0" smtClean="0"/>
+              <a:rPr lang="en-US" dirty="0"/>
               <a:t>list the 6 steps of the design recipe</a:t>
             </a:r>
           </a:p>
           <a:p>
             <a:pPr lvl="1"/>
             <a:r>
-              <a:rPr lang="en-US" dirty="0" smtClean="0"/>
+              <a:rPr lang="en-US" dirty="0"/>
               <a:t>recite some of the slogans that we will use throughout the course.</a:t>
             </a:r>
           </a:p>
@@ -8609,13 +8522,6 @@
   <p:clrMapOvr>
     <a:masterClrMapping/>
   </p:clrMapOvr>
-  <p:timing>
-    <p:tnLst>
-      <p:par>
-        <p:cTn id="1" dur="indefinite" restart="never" nodeType="tmRoot"/>
-      </p:par>
-    </p:tnLst>
-  </p:timing>
 </p:sld>
 </file>
 
@@ -8662,7 +8568,13 @@
                 <a:tableStyleId>{5C22544A-7EE6-4342-B048-85BDC9FD1C3A}</a:tableStyleId>
               </a:tblPr>
               <a:tblGrid>
-                <a:gridCol w="8686800"/>
+                <a:gridCol w="8686800">
+                  <a:extLst>
+                    <a:ext uri="{9D8B030D-6E8A-4147-A177-3AD203B41FA5}">
+                      <a16:colId xmlns:a16="http://schemas.microsoft.com/office/drawing/2014/main" val="20000"/>
+                    </a:ext>
+                  </a:extLst>
+                </a:gridCol>
               </a:tblGrid>
               <a:tr h="1066800">
                 <a:tc>
@@ -8672,14 +8584,18 @@
                     <a:p>
                       <a:pPr algn="ctr"/>
                       <a:r>
-                        <a:rPr lang="en-US" sz="8000" dirty="0" smtClean="0"/>
+                        <a:rPr lang="en-US" sz="8000" dirty="0"/>
                         <a:t>The Point</a:t>
                       </a:r>
-                      <a:endParaRPr lang="en-US" sz="8000" dirty="0"/>
                     </a:p>
                   </a:txBody>
                   <a:tcPr/>
                 </a:tc>
+                <a:extLst>
+                  <a:ext uri="{0D108BD9-81ED-4DB2-BD59-A6C34878D82A}">
+                    <a16:rowId xmlns:a16="http://schemas.microsoft.com/office/drawing/2014/main" val="10000"/>
+                  </a:ext>
+                </a:extLst>
               </a:tr>
               <a:tr h="370840">
                 <a:tc>
@@ -8688,15 +8604,15 @@
                     <a:lstStyle/>
                     <a:p>
                       <a:r>
-                        <a:rPr lang="en-US" sz="3200" dirty="0" smtClean="0"/>
+                        <a:rPr lang="en-US" sz="3200" dirty="0"/>
                         <a:t>1. It’s not calculus.</a:t>
                       </a:r>
                       <a:r>
-                        <a:rPr lang="en-US" sz="3200" baseline="0" dirty="0" smtClean="0"/>
+                        <a:rPr lang="en-US" sz="3200" baseline="0" dirty="0"/>
                         <a:t>  Getting the right answer is </a:t>
                       </a:r>
                       <a:r>
-                        <a:rPr lang="en-US" sz="3200" baseline="0" dirty="0" smtClean="0">
+                        <a:rPr lang="en-US" sz="3200" baseline="0" dirty="0">
                           <a:solidFill>
                             <a:srgbClr val="FF0000"/>
                           </a:solidFill>
@@ -8705,7 +8621,7 @@
                         <a:t>not enough</a:t>
                       </a:r>
                       <a:r>
-                        <a:rPr lang="en-US" sz="3200" baseline="0" dirty="0" smtClean="0"/>
+                        <a:rPr lang="en-US" sz="3200" baseline="0" dirty="0"/>
                         <a:t>.</a:t>
                       </a:r>
                       <a:endParaRPr lang="en-US" sz="3200" dirty="0"/>
@@ -8713,6 +8629,11 @@
                   </a:txBody>
                   <a:tcPr/>
                 </a:tc>
+                <a:extLst>
+                  <a:ext uri="{0D108BD9-81ED-4DB2-BD59-A6C34878D82A}">
+                    <a16:rowId xmlns:a16="http://schemas.microsoft.com/office/drawing/2014/main" val="10001"/>
+                  </a:ext>
+                </a:extLst>
               </a:tr>
               <a:tr h="370840">
                 <a:tc>
@@ -8721,15 +8642,15 @@
                     <a:lstStyle/>
                     <a:p>
                       <a:r>
-                        <a:rPr lang="en-US" sz="3200" dirty="0" smtClean="0"/>
+                        <a:rPr lang="en-US" sz="3200" dirty="0"/>
                         <a:t>2. The goal</a:t>
                       </a:r>
                       <a:r>
-                        <a:rPr lang="en-US" sz="3200" baseline="0" dirty="0" smtClean="0"/>
+                        <a:rPr lang="en-US" sz="3200" baseline="0" dirty="0"/>
                         <a:t> is to write </a:t>
                       </a:r>
                       <a:r>
-                        <a:rPr lang="en-US" sz="3200" i="0" baseline="0" dirty="0" smtClean="0">
+                        <a:rPr lang="en-US" sz="3200" i="0" baseline="0" dirty="0">
                           <a:solidFill>
                             <a:srgbClr val="FF0000"/>
                           </a:solidFill>
@@ -8738,7 +8659,7 @@
                         <a:t>beautiful programs</a:t>
                       </a:r>
                       <a:r>
-                        <a:rPr lang="en-US" sz="3200" baseline="0" dirty="0" smtClean="0"/>
+                        <a:rPr lang="en-US" sz="3200" baseline="0" dirty="0"/>
                         <a:t>.</a:t>
                       </a:r>
                       <a:endParaRPr lang="en-US" sz="3200" dirty="0"/>
@@ -8746,6 +8667,11 @@
                   </a:txBody>
                   <a:tcPr/>
                 </a:tc>
+                <a:extLst>
+                  <a:ext uri="{0D108BD9-81ED-4DB2-BD59-A6C34878D82A}">
+                    <a16:rowId xmlns:a16="http://schemas.microsoft.com/office/drawing/2014/main" val="10002"/>
+                  </a:ext>
+                </a:extLst>
               </a:tr>
               <a:tr h="370840">
                 <a:tc>
@@ -8771,11 +8697,11 @@
                         <a:defRPr/>
                       </a:pPr>
                       <a:r>
-                        <a:rPr lang="en-US" sz="3200" dirty="0" smtClean="0"/>
+                        <a:rPr lang="en-US" sz="3200" dirty="0"/>
                         <a:t>3.</a:t>
                       </a:r>
                       <a:r>
-                        <a:rPr lang="en-US" sz="3200" baseline="0" dirty="0" smtClean="0"/>
+                        <a:rPr lang="en-US" sz="3200" baseline="0" dirty="0"/>
                         <a:t> A beautiful program is one that is readable, understandable, and modifiable by people.</a:t>
                       </a:r>
                       <a:endParaRPr lang="en-US" sz="3200" dirty="0"/>
@@ -8783,6 +8709,11 @@
                   </a:txBody>
                   <a:tcPr/>
                 </a:tc>
+                <a:extLst>
+                  <a:ext uri="{0D108BD9-81ED-4DB2-BD59-A6C34878D82A}">
+                    <a16:rowId xmlns:a16="http://schemas.microsoft.com/office/drawing/2014/main" val="10003"/>
+                  </a:ext>
+                </a:extLst>
               </a:tr>
             </a:tbl>
           </a:graphicData>
@@ -8821,13 +8752,6 @@
   <p:clrMapOvr>
     <a:masterClrMapping/>
   </p:clrMapOvr>
-  <p:timing>
-    <p:tnLst>
-      <p:par>
-        <p:cTn id="1" dur="indefinite" restart="never" nodeType="tmRoot"/>
-      </p:par>
-    </p:tnLst>
-  </p:timing>
 </p:sld>
 </file>
 
@@ -8866,10 +8790,9 @@
           <a:lstStyle/>
           <a:p>
             <a:r>
-              <a:rPr lang="en-US" dirty="0" smtClean="0"/>
+              <a:rPr lang="en-US" dirty="0"/>
               <a:t>Your programs should look like this:</a:t>
             </a:r>
-            <a:endParaRPr lang="en-US" dirty="0"/>
           </a:p>
         </p:txBody>
       </p:sp>
@@ -8961,7 +8884,7 @@
           <a:lstStyle/>
           <a:p>
             <a:r>
-              <a:rPr lang="en-US" sz="1200" dirty="0" smtClean="0">
+              <a:rPr lang="en-US" sz="1200" dirty="0">
                 <a:hlinkClick r:id="rId4"/>
               </a:rPr>
               <a:t>source</a:t>
@@ -9016,10 +8939,9 @@
           <a:lstStyle/>
           <a:p>
             <a:r>
-              <a:rPr lang="en-US" dirty="0" smtClean="0"/>
+              <a:rPr lang="en-US" dirty="0"/>
               <a:t>Not like this</a:t>
             </a:r>
-            <a:endParaRPr lang="en-US" dirty="0"/>
           </a:p>
         </p:txBody>
       </p:sp>
@@ -9111,7 +9033,7 @@
           <a:lstStyle/>
           <a:p>
             <a:r>
-              <a:rPr lang="en-US" sz="1200" dirty="0" smtClean="0">
+              <a:rPr lang="en-US" sz="1200" dirty="0">
                 <a:hlinkClick r:id="rId4"/>
               </a:rPr>
               <a:t>source</a:t>
@@ -9166,10 +9088,9 @@
           <a:lstStyle/>
           <a:p>
             <a:r>
-              <a:rPr lang="en-US" dirty="0" smtClean="0"/>
+              <a:rPr lang="en-US" dirty="0"/>
               <a:t>Your programs should look like this</a:t>
             </a:r>
-            <a:endParaRPr lang="en-US" dirty="0"/>
           </a:p>
         </p:txBody>
       </p:sp>
@@ -9261,7 +9182,7 @@
           <a:lstStyle/>
           <a:p>
             <a:r>
-              <a:rPr lang="en-US" sz="1200" dirty="0" smtClean="0">
+              <a:rPr lang="en-US" sz="1200" dirty="0">
                 <a:hlinkClick r:id="rId4"/>
               </a:rPr>
               <a:t>source</a:t>
@@ -9316,10 +9237,9 @@
           <a:lstStyle/>
           <a:p>
             <a:r>
-              <a:rPr lang="en-US" dirty="0" smtClean="0"/>
+              <a:rPr lang="en-US" dirty="0"/>
               <a:t>Not like this</a:t>
             </a:r>
-            <a:endParaRPr lang="en-US" dirty="0"/>
           </a:p>
         </p:txBody>
       </p:sp>
@@ -9411,7 +9331,7 @@
           <a:lstStyle/>
           <a:p>
             <a:r>
-              <a:rPr lang="en-US" sz="1200" dirty="0" smtClean="0">
+              <a:rPr lang="en-US" sz="1200" dirty="0">
                 <a:hlinkClick r:id="rId4"/>
               </a:rPr>
               <a:t>source</a:t>
@@ -9466,10 +9386,9 @@
           <a:lstStyle/>
           <a:p>
             <a:r>
-              <a:rPr lang="en-US" dirty="0" smtClean="0"/>
+              <a:rPr lang="en-US" dirty="0"/>
               <a:t>And never, ever like this</a:t>
             </a:r>
-            <a:endParaRPr lang="en-US" dirty="0"/>
           </a:p>
         </p:txBody>
       </p:sp>
@@ -9561,7 +9480,7 @@
           <a:lstStyle/>
           <a:p>
             <a:r>
-              <a:rPr lang="en-US" sz="1200" dirty="0" smtClean="0">
+              <a:rPr lang="en-US" sz="1200" dirty="0">
                 <a:hlinkClick r:id="rId4"/>
               </a:rPr>
               <a:t>source</a:t>
@@ -9626,7 +9545,13 @@
                 <a:tableStyleId>{5C22544A-7EE6-4342-B048-85BDC9FD1C3A}</a:tableStyleId>
               </a:tblPr>
               <a:tblGrid>
-                <a:gridCol w="8229600"/>
+                <a:gridCol w="8229600">
+                  <a:extLst>
+                    <a:ext uri="{9D8B030D-6E8A-4147-A177-3AD203B41FA5}">
+                      <a16:colId xmlns:a16="http://schemas.microsoft.com/office/drawing/2014/main" val="20000"/>
+                    </a:ext>
+                  </a:extLst>
+                </a:gridCol>
               </a:tblGrid>
               <a:tr h="370840">
                 <a:tc>
@@ -9636,14 +9561,18 @@
                     <a:p>
                       <a:pPr algn="ctr"/>
                       <a:r>
-                        <a:rPr lang="en-US" sz="3200" dirty="0" smtClean="0"/>
+                        <a:rPr lang="en-US" sz="3200" dirty="0"/>
                         <a:t>Principles for writing beautiful programs</a:t>
                       </a:r>
-                      <a:endParaRPr lang="en-US" sz="3200" dirty="0"/>
                     </a:p>
                   </a:txBody>
                   <a:tcPr/>
                 </a:tc>
+                <a:extLst>
+                  <a:ext uri="{0D108BD9-81ED-4DB2-BD59-A6C34878D82A}">
+                    <a16:rowId xmlns:a16="http://schemas.microsoft.com/office/drawing/2014/main" val="10000"/>
+                  </a:ext>
+                </a:extLst>
               </a:tr>
               <a:tr h="370840">
                 <a:tc>
@@ -9652,22 +9581,26 @@
                     <a:lstStyle/>
                     <a:p>
                       <a:r>
-                        <a:rPr lang="en-US" sz="3200" dirty="0" smtClean="0"/>
+                        <a:rPr lang="en-US" sz="3200" dirty="0"/>
                         <a:t>1. Always</a:t>
                       </a:r>
                       <a:r>
-                        <a:rPr lang="en-US" sz="3200" baseline="0" dirty="0" smtClean="0"/>
+                        <a:rPr lang="en-US" sz="3200" baseline="0" dirty="0"/>
                         <a:t> remember: </a:t>
                       </a:r>
                       <a:r>
-                        <a:rPr lang="en-US" sz="3200" dirty="0" smtClean="0"/>
+                        <a:rPr lang="en-US" sz="3200" dirty="0"/>
                         <a:t>Programming is a People Discipline</a:t>
                       </a:r>
-                      <a:endParaRPr lang="en-US" sz="3200" dirty="0"/>
                     </a:p>
                   </a:txBody>
                   <a:tcPr/>
                 </a:tc>
+                <a:extLst>
+                  <a:ext uri="{0D108BD9-81ED-4DB2-BD59-A6C34878D82A}">
+                    <a16:rowId xmlns:a16="http://schemas.microsoft.com/office/drawing/2014/main" val="10001"/>
+                  </a:ext>
+                </a:extLst>
               </a:tr>
               <a:tr h="370840">
                 <a:tc>
@@ -9676,14 +9609,18 @@
                     <a:lstStyle/>
                     <a:p>
                       <a:r>
-                        <a:rPr lang="en-US" sz="3200" dirty="0" smtClean="0"/>
+                        <a:rPr lang="en-US" sz="3200" dirty="0"/>
                         <a:t>2. Represent Information as Data; Interpret Data as Information</a:t>
                       </a:r>
-                      <a:endParaRPr lang="en-US" sz="3200" dirty="0"/>
                     </a:p>
                   </a:txBody>
                   <a:tcPr/>
                 </a:tc>
+                <a:extLst>
+                  <a:ext uri="{0D108BD9-81ED-4DB2-BD59-A6C34878D82A}">
+                    <a16:rowId xmlns:a16="http://schemas.microsoft.com/office/drawing/2014/main" val="10002"/>
+                  </a:ext>
+                </a:extLst>
               </a:tr>
               <a:tr h="370840">
                 <a:tc>
@@ -9709,11 +9646,11 @@
                         <a:defRPr/>
                       </a:pPr>
                       <a:r>
-                        <a:rPr lang="en-US" sz="3200" dirty="0" smtClean="0"/>
+                        <a:rPr lang="en-US" sz="3200" dirty="0"/>
                         <a:t>3.</a:t>
                       </a:r>
                       <a:r>
-                        <a:rPr lang="en-US" sz="3200" baseline="0" dirty="0" smtClean="0"/>
+                        <a:rPr lang="en-US" sz="3200" baseline="0" dirty="0"/>
                         <a:t> Programs should consist of functions and methods that consume and produce values</a:t>
                       </a:r>
                       <a:endParaRPr lang="en-US" sz="3200" dirty="0"/>
@@ -9721,6 +9658,11 @@
                   </a:txBody>
                   <a:tcPr/>
                 </a:tc>
+                <a:extLst>
+                  <a:ext uri="{0D108BD9-81ED-4DB2-BD59-A6C34878D82A}">
+                    <a16:rowId xmlns:a16="http://schemas.microsoft.com/office/drawing/2014/main" val="10003"/>
+                  </a:ext>
+                </a:extLst>
               </a:tr>
               <a:tr h="370840">
                 <a:tc>
@@ -9729,18 +9671,23 @@
                     <a:lstStyle/>
                     <a:p>
                       <a:r>
-                        <a:rPr lang="en-US" sz="3200" dirty="0" smtClean="0"/>
+                        <a:rPr lang="en-US" sz="3200" dirty="0"/>
                         <a:t>4. Design Functions</a:t>
                       </a:r>
                       <a:r>
-                        <a:rPr lang="en-US" sz="3200" baseline="0" dirty="0" smtClean="0"/>
+                        <a:rPr lang="en-US" sz="3200" baseline="0" dirty="0"/>
                         <a:t> Systematically</a:t>
                       </a:r>
-                      <a:endParaRPr lang="en-US" sz="3200" dirty="0" smtClean="0"/>
+                      <a:endParaRPr lang="en-US" sz="3200" dirty="0"/>
                     </a:p>
                   </a:txBody>
                   <a:tcPr/>
                 </a:tc>
+                <a:extLst>
+                  <a:ext uri="{0D108BD9-81ED-4DB2-BD59-A6C34878D82A}">
+                    <a16:rowId xmlns:a16="http://schemas.microsoft.com/office/drawing/2014/main" val="10004"/>
+                  </a:ext>
+                </a:extLst>
               </a:tr>
               <a:tr h="370840">
                 <a:tc>
@@ -9749,14 +9696,18 @@
                     <a:lstStyle/>
                     <a:p>
                       <a:r>
-                        <a:rPr lang="en-US" sz="3200" dirty="0" smtClean="0"/>
+                        <a:rPr lang="en-US" sz="3200" dirty="0"/>
                         <a:t>5. Design Systems Iteratively</a:t>
                       </a:r>
-                      <a:endParaRPr lang="en-US" sz="3200" dirty="0"/>
                     </a:p>
                   </a:txBody>
                   <a:tcPr/>
                 </a:tc>
+                <a:extLst>
+                  <a:ext uri="{0D108BD9-81ED-4DB2-BD59-A6C34878D82A}">
+                    <a16:rowId xmlns:a16="http://schemas.microsoft.com/office/drawing/2014/main" val="10005"/>
+                  </a:ext>
+                </a:extLst>
               </a:tr>
               <a:tr h="370840">
                 <a:tc>
@@ -9765,14 +9716,18 @@
                     <a:lstStyle/>
                     <a:p>
                       <a:r>
-                        <a:rPr lang="en-US" sz="3200" dirty="0" smtClean="0"/>
+                        <a:rPr lang="en-US" sz="3200" dirty="0"/>
                         <a:t>6. Pass values when you can, share state only when you must.</a:t>
                       </a:r>
-                      <a:endParaRPr lang="en-US" sz="3200" dirty="0"/>
                     </a:p>
                   </a:txBody>
                   <a:tcPr/>
                 </a:tc>
+                <a:extLst>
+                  <a:ext uri="{0D108BD9-81ED-4DB2-BD59-A6C34878D82A}">
+                    <a16:rowId xmlns:a16="http://schemas.microsoft.com/office/drawing/2014/main" val="10006"/>
+                  </a:ext>
+                </a:extLst>
               </a:tr>
             </a:tbl>
           </a:graphicData>
@@ -9811,13 +9766,6 @@
   <p:clrMapOvr>
     <a:masterClrMapping/>
   </p:clrMapOvr>
-  <p:timing>
-    <p:tnLst>
-      <p:par>
-        <p:cTn id="1" dur="indefinite" restart="never" nodeType="tmRoot"/>
-      </p:par>
-    </p:tnLst>
-  </p:timing>
 </p:sld>
 </file>
 

</xml_diff>